<commit_message>
Updated training records, graphs needed
</commit_message>
<xml_diff>
--- a/Review 2.pptx
+++ b/Review 2.pptx
@@ -6,27 +6,33 @@
     <p:sldMasterId id="2147483660" r:id="rId2"/>
   </p:sldMasterIdLst>
   <p:notesMasterIdLst>
-    <p:notesMasterId r:id="rId18"/>
+    <p:notesMasterId r:id="rId24"/>
   </p:notesMasterIdLst>
   <p:handoutMasterIdLst>
-    <p:handoutMasterId r:id="rId19"/>
+    <p:handoutMasterId r:id="rId25"/>
   </p:handoutMasterIdLst>
   <p:sldIdLst>
     <p:sldId id="256" r:id="rId3"/>
-    <p:sldId id="266" r:id="rId4"/>
-    <p:sldId id="268" r:id="rId5"/>
-    <p:sldId id="269" r:id="rId6"/>
-    <p:sldId id="270" r:id="rId7"/>
-    <p:sldId id="271" r:id="rId8"/>
-    <p:sldId id="275" r:id="rId9"/>
-    <p:sldId id="276" r:id="rId10"/>
-    <p:sldId id="277" r:id="rId11"/>
-    <p:sldId id="278" r:id="rId12"/>
-    <p:sldId id="279" r:id="rId13"/>
-    <p:sldId id="280" r:id="rId14"/>
-    <p:sldId id="281" r:id="rId15"/>
-    <p:sldId id="282" r:id="rId16"/>
-    <p:sldId id="283" r:id="rId17"/>
+    <p:sldId id="257" r:id="rId4"/>
+    <p:sldId id="258" r:id="rId5"/>
+    <p:sldId id="263" r:id="rId6"/>
+    <p:sldId id="264" r:id="rId7"/>
+    <p:sldId id="265" r:id="rId8"/>
+    <p:sldId id="266" r:id="rId9"/>
+    <p:sldId id="268" r:id="rId10"/>
+    <p:sldId id="269" r:id="rId11"/>
+    <p:sldId id="270" r:id="rId12"/>
+    <p:sldId id="271" r:id="rId13"/>
+    <p:sldId id="275" r:id="rId14"/>
+    <p:sldId id="276" r:id="rId15"/>
+    <p:sldId id="277" r:id="rId16"/>
+    <p:sldId id="284" r:id="rId17"/>
+    <p:sldId id="278" r:id="rId18"/>
+    <p:sldId id="279" r:id="rId19"/>
+    <p:sldId id="280" r:id="rId20"/>
+    <p:sldId id="281" r:id="rId21"/>
+    <p:sldId id="282" r:id="rId22"/>
+    <p:sldId id="283" r:id="rId23"/>
   </p:sldIdLst>
   <p:sldSz cx="10080625" cy="7559675"/>
   <p:notesSz cx="7559675" cy="10691813"/>
@@ -2019,6 +2025,236 @@
 </p:notes>
 </file>
 
+<file path=ppt/notesSlides/notesSlide10.xml><?xml version="1.0" encoding="utf-8"?>
+<p:notes xmlns:a="http://schemas.openxmlformats.org/drawingml/2006/main" xmlns:r="http://schemas.openxmlformats.org/officeDocument/2006/relationships" xmlns:p="http://schemas.openxmlformats.org/presentationml/2006/main">
+  <p:cSld>
+    <p:spTree>
+      <p:nvGrpSpPr>
+        <p:cNvPr id="1" name=""/>
+        <p:cNvGrpSpPr/>
+        <p:nvPr/>
+      </p:nvGrpSpPr>
+      <p:grpSpPr>
+        <a:xfrm>
+          <a:off x="0" y="0"/>
+          <a:ext cx="0" cy="0"/>
+          <a:chOff x="0" y="0"/>
+          <a:chExt cx="0" cy="0"/>
+        </a:xfrm>
+      </p:grpSpPr>
+      <p:sp>
+        <p:nvSpPr>
+          <p:cNvPr id="7" name="Slide Number Placeholder 6">
+            <a:extLst>
+              <a:ext uri="{FF2B5EF4-FFF2-40B4-BE49-F238E27FC236}">
+                <a16:creationId xmlns:a16="http://schemas.microsoft.com/office/drawing/2014/main" id="{CAC6AAFD-CD59-4841-86D0-F7F2412B8BED}"/>
+              </a:ext>
+            </a:extLst>
+          </p:cNvPr>
+          <p:cNvSpPr txBox="1">
+            <a:spLocks noGrp="1"/>
+          </p:cNvSpPr>
+          <p:nvPr>
+            <p:ph type="sldNum" sz="quarter" idx="5"/>
+          </p:nvPr>
+        </p:nvSpPr>
+        <p:spPr>
+          <a:ln/>
+        </p:spPr>
+        <p:txBody>
+          <a:bodyPr lIns="0" tIns="0" rIns="0" bIns="0" anchor="b" anchorCtr="0">
+            <a:noAutofit/>
+          </a:bodyPr>
+          <a:lstStyle/>
+          <a:p>
+            <a:pPr lvl="0"/>
+            <a:fld id="{BAF2A142-5636-4FEF-AC9E-F583B0E9FB61}" type="slidenum">
+              <a:t>10</a:t>
+            </a:fld>
+            <a:endParaRPr lang="en-IN"/>
+          </a:p>
+        </p:txBody>
+      </p:sp>
+      <p:sp>
+        <p:nvSpPr>
+          <p:cNvPr id="2" name="Slide Image Placeholder 1">
+            <a:extLst>
+              <a:ext uri="{FF2B5EF4-FFF2-40B4-BE49-F238E27FC236}">
+                <a16:creationId xmlns:a16="http://schemas.microsoft.com/office/drawing/2014/main" id="{F64075C8-802C-4EDD-B932-4F9DA36F357E}"/>
+              </a:ext>
+            </a:extLst>
+          </p:cNvPr>
+          <p:cNvSpPr>
+            <a:spLocks noGrp="1" noRot="1" noChangeAspect="1" noResize="1"/>
+          </p:cNvSpPr>
+          <p:nvPr>
+            <p:ph type="sldImg"/>
+          </p:nvPr>
+        </p:nvSpPr>
+        <p:spPr>
+          <a:xfrm>
+            <a:off x="1106488" y="812800"/>
+            <a:ext cx="5345112" cy="4008438"/>
+          </a:xfrm>
+          <a:solidFill>
+            <a:srgbClr val="729FCF"/>
+          </a:solidFill>
+          <a:ln w="25400">
+            <a:solidFill>
+              <a:srgbClr val="3465AF"/>
+            </a:solidFill>
+            <a:prstDash val="solid"/>
+          </a:ln>
+        </p:spPr>
+      </p:sp>
+      <p:sp>
+        <p:nvSpPr>
+          <p:cNvPr id="3" name="Notes Placeholder 2">
+            <a:extLst>
+              <a:ext uri="{FF2B5EF4-FFF2-40B4-BE49-F238E27FC236}">
+                <a16:creationId xmlns:a16="http://schemas.microsoft.com/office/drawing/2014/main" id="{086C35CB-AE58-4F4E-BB44-C6FBA7A233EB}"/>
+              </a:ext>
+            </a:extLst>
+          </p:cNvPr>
+          <p:cNvSpPr txBox="1">
+            <a:spLocks noGrp="1"/>
+          </p:cNvSpPr>
+          <p:nvPr>
+            <p:ph type="body" sz="quarter" idx="1"/>
+          </p:nvPr>
+        </p:nvSpPr>
+        <p:spPr/>
+        <p:txBody>
+          <a:bodyPr/>
+          <a:lstStyle/>
+          <a:p>
+            <a:endParaRPr lang="en-IN" sz="2000"/>
+          </a:p>
+        </p:txBody>
+      </p:sp>
+    </p:spTree>
+  </p:cSld>
+  <p:clrMapOvr>
+    <a:masterClrMapping/>
+  </p:clrMapOvr>
+</p:notes>
+</file>
+
+<file path=ppt/notesSlides/notesSlide11.xml><?xml version="1.0" encoding="utf-8"?>
+<p:notes xmlns:a="http://schemas.openxmlformats.org/drawingml/2006/main" xmlns:r="http://schemas.openxmlformats.org/officeDocument/2006/relationships" xmlns:p="http://schemas.openxmlformats.org/presentationml/2006/main">
+  <p:cSld>
+    <p:spTree>
+      <p:nvGrpSpPr>
+        <p:cNvPr id="1" name=""/>
+        <p:cNvGrpSpPr/>
+        <p:nvPr/>
+      </p:nvGrpSpPr>
+      <p:grpSpPr>
+        <a:xfrm>
+          <a:off x="0" y="0"/>
+          <a:ext cx="0" cy="0"/>
+          <a:chOff x="0" y="0"/>
+          <a:chExt cx="0" cy="0"/>
+        </a:xfrm>
+      </p:grpSpPr>
+      <p:sp>
+        <p:nvSpPr>
+          <p:cNvPr id="7" name="Slide Number Placeholder 6">
+            <a:extLst>
+              <a:ext uri="{FF2B5EF4-FFF2-40B4-BE49-F238E27FC236}">
+                <a16:creationId xmlns:a16="http://schemas.microsoft.com/office/drawing/2014/main" id="{EDF002E1-2244-4A4F-B953-005741CBC0B0}"/>
+              </a:ext>
+            </a:extLst>
+          </p:cNvPr>
+          <p:cNvSpPr txBox="1">
+            <a:spLocks noGrp="1"/>
+          </p:cNvSpPr>
+          <p:nvPr>
+            <p:ph type="sldNum" sz="quarter" idx="5"/>
+          </p:nvPr>
+        </p:nvSpPr>
+        <p:spPr>
+          <a:ln/>
+        </p:spPr>
+        <p:txBody>
+          <a:bodyPr lIns="0" tIns="0" rIns="0" bIns="0" anchor="b" anchorCtr="0">
+            <a:noAutofit/>
+          </a:bodyPr>
+          <a:lstStyle/>
+          <a:p>
+            <a:pPr lvl="0"/>
+            <a:fld id="{5118A795-3231-4B20-B2D1-A7AB84E4BFE6}" type="slidenum">
+              <a:t>11</a:t>
+            </a:fld>
+            <a:endParaRPr lang="en-IN"/>
+          </a:p>
+        </p:txBody>
+      </p:sp>
+      <p:sp>
+        <p:nvSpPr>
+          <p:cNvPr id="2" name="Slide Image Placeholder 1">
+            <a:extLst>
+              <a:ext uri="{FF2B5EF4-FFF2-40B4-BE49-F238E27FC236}">
+                <a16:creationId xmlns:a16="http://schemas.microsoft.com/office/drawing/2014/main" id="{0E3E6FCC-E12E-42DA-9B87-E973F108E688}"/>
+              </a:ext>
+            </a:extLst>
+          </p:cNvPr>
+          <p:cNvSpPr>
+            <a:spLocks noGrp="1" noRot="1" noChangeAspect="1" noResize="1"/>
+          </p:cNvSpPr>
+          <p:nvPr>
+            <p:ph type="sldImg"/>
+          </p:nvPr>
+        </p:nvSpPr>
+        <p:spPr>
+          <a:xfrm>
+            <a:off x="1106488" y="812800"/>
+            <a:ext cx="5345112" cy="4008438"/>
+          </a:xfrm>
+          <a:solidFill>
+            <a:srgbClr val="729FCF"/>
+          </a:solidFill>
+          <a:ln w="25400">
+            <a:solidFill>
+              <a:srgbClr val="3465AF"/>
+            </a:solidFill>
+            <a:prstDash val="solid"/>
+          </a:ln>
+        </p:spPr>
+      </p:sp>
+      <p:sp>
+        <p:nvSpPr>
+          <p:cNvPr id="3" name="Notes Placeholder 2">
+            <a:extLst>
+              <a:ext uri="{FF2B5EF4-FFF2-40B4-BE49-F238E27FC236}">
+                <a16:creationId xmlns:a16="http://schemas.microsoft.com/office/drawing/2014/main" id="{A28C6B34-72C2-4881-86F2-DAA6F6E17290}"/>
+              </a:ext>
+            </a:extLst>
+          </p:cNvPr>
+          <p:cNvSpPr txBox="1">
+            <a:spLocks noGrp="1"/>
+          </p:cNvSpPr>
+          <p:nvPr>
+            <p:ph type="body" sz="quarter" idx="1"/>
+          </p:nvPr>
+        </p:nvSpPr>
+        <p:spPr/>
+        <p:txBody>
+          <a:bodyPr/>
+          <a:lstStyle/>
+          <a:p>
+            <a:endParaRPr lang="en-IN" sz="2000"/>
+          </a:p>
+        </p:txBody>
+      </p:sp>
+    </p:spTree>
+  </p:cSld>
+  <p:clrMapOvr>
+    <a:masterClrMapping/>
+  </p:clrMapOvr>
+</p:notes>
+</file>
+
 <file path=ppt/notesSlides/notesSlide2.xml><?xml version="1.0" encoding="utf-8"?>
 <p:notes xmlns:a="http://schemas.openxmlformats.org/drawingml/2006/main" xmlns:r="http://schemas.openxmlformats.org/officeDocument/2006/relationships" xmlns:p="http://schemas.openxmlformats.org/presentationml/2006/main">
   <p:cSld>
@@ -2041,7 +2277,7 @@
           <p:cNvPr id="7" name="Slide Number Placeholder 6">
             <a:extLst>
               <a:ext uri="{FF2B5EF4-FFF2-40B4-BE49-F238E27FC236}">
-                <a16:creationId xmlns:a16="http://schemas.microsoft.com/office/drawing/2014/main" id="{AC909474-272F-4ABC-9C36-A88DA9DAFEFD}"/>
+                <a16:creationId xmlns:a16="http://schemas.microsoft.com/office/drawing/2014/main" id="{832409A3-109A-4F0E-B8DA-A2B2937B6638}"/>
               </a:ext>
             </a:extLst>
           </p:cNvPr>
@@ -2062,7 +2298,7 @@
           <a:lstStyle/>
           <a:p>
             <a:pPr lvl="0"/>
-            <a:fld id="{7B0D0D4C-46B2-4614-8823-5A718BF9D7D4}" type="slidenum">
+            <a:fld id="{37648E56-E553-457A-9FEE-F2BA7E11D60C}" type="slidenum">
               <a:t>2</a:t>
             </a:fld>
             <a:endParaRPr lang="en-IN"/>
@@ -2074,7 +2310,7 @@
           <p:cNvPr id="2" name="Slide Image Placeholder 1">
             <a:extLst>
               <a:ext uri="{FF2B5EF4-FFF2-40B4-BE49-F238E27FC236}">
-                <a16:creationId xmlns:a16="http://schemas.microsoft.com/office/drawing/2014/main" id="{7A158262-3874-41C4-9DE9-361C2EDD1552}"/>
+                <a16:creationId xmlns:a16="http://schemas.microsoft.com/office/drawing/2014/main" id="{15BEE633-752A-4900-9894-1C4E92A93D2D}"/>
               </a:ext>
             </a:extLst>
           </p:cNvPr>
@@ -2106,7 +2342,7 @@
           <p:cNvPr id="3" name="Notes Placeholder 2">
             <a:extLst>
               <a:ext uri="{FF2B5EF4-FFF2-40B4-BE49-F238E27FC236}">
-                <a16:creationId xmlns:a16="http://schemas.microsoft.com/office/drawing/2014/main" id="{9F01311E-8E34-4723-8DFA-C1F1965FD0EB}"/>
+                <a16:creationId xmlns:a16="http://schemas.microsoft.com/office/drawing/2014/main" id="{48A9CAAE-426B-45DD-9FEC-FBE70F939B69}"/>
               </a:ext>
             </a:extLst>
           </p:cNvPr>
@@ -2158,7 +2394,7 @@
           <p:cNvPr id="7" name="Slide Number Placeholder 6">
             <a:extLst>
               <a:ext uri="{FF2B5EF4-FFF2-40B4-BE49-F238E27FC236}">
-                <a16:creationId xmlns:a16="http://schemas.microsoft.com/office/drawing/2014/main" id="{F96B5709-D1E0-4F29-B58B-7393298DF401}"/>
+                <a16:creationId xmlns:a16="http://schemas.microsoft.com/office/drawing/2014/main" id="{FAA6CBFE-BD9A-4385-8E33-B2E5B3890C84}"/>
               </a:ext>
             </a:extLst>
           </p:cNvPr>
@@ -2179,7 +2415,7 @@
           <a:lstStyle/>
           <a:p>
             <a:pPr lvl="0"/>
-            <a:fld id="{09A38D68-9882-4F76-9F07-700A3DE1081A}" type="slidenum">
+            <a:fld id="{C47DC763-EBA2-46CF-BF9F-B02EA084C139}" type="slidenum">
               <a:t>3</a:t>
             </a:fld>
             <a:endParaRPr lang="en-IN"/>
@@ -2191,7 +2427,7 @@
           <p:cNvPr id="2" name="Slide Image Placeholder 1">
             <a:extLst>
               <a:ext uri="{FF2B5EF4-FFF2-40B4-BE49-F238E27FC236}">
-                <a16:creationId xmlns:a16="http://schemas.microsoft.com/office/drawing/2014/main" id="{045A07A4-DC07-453D-A594-9ADF48D1F65C}"/>
+                <a16:creationId xmlns:a16="http://schemas.microsoft.com/office/drawing/2014/main" id="{305AE363-86F9-43A7-81F9-A4CE5E625830}"/>
               </a:ext>
             </a:extLst>
           </p:cNvPr>
@@ -2223,7 +2459,7 @@
           <p:cNvPr id="3" name="Notes Placeholder 2">
             <a:extLst>
               <a:ext uri="{FF2B5EF4-FFF2-40B4-BE49-F238E27FC236}">
-                <a16:creationId xmlns:a16="http://schemas.microsoft.com/office/drawing/2014/main" id="{B31EF5B8-86E3-47F7-80EE-FEEE5575705A}"/>
+                <a16:creationId xmlns:a16="http://schemas.microsoft.com/office/drawing/2014/main" id="{76E7E0FF-B900-4B45-852A-927584805AF4}"/>
               </a:ext>
             </a:extLst>
           </p:cNvPr>
@@ -2275,7 +2511,7 @@
           <p:cNvPr id="7" name="Slide Number Placeholder 6">
             <a:extLst>
               <a:ext uri="{FF2B5EF4-FFF2-40B4-BE49-F238E27FC236}">
-                <a16:creationId xmlns:a16="http://schemas.microsoft.com/office/drawing/2014/main" id="{0E0196FB-F2C8-449C-880D-ABD33A93166C}"/>
+                <a16:creationId xmlns:a16="http://schemas.microsoft.com/office/drawing/2014/main" id="{A7E729D3-4CB7-497B-8BE4-A3DF03C465D8}"/>
               </a:ext>
             </a:extLst>
           </p:cNvPr>
@@ -2296,7 +2532,7 @@
           <a:lstStyle/>
           <a:p>
             <a:pPr lvl="0"/>
-            <a:fld id="{A168A4A5-757A-4414-B1A1-273AE331BA64}" type="slidenum">
+            <a:fld id="{D393E300-6D70-46FE-80CE-176DEA52054D}" type="slidenum">
               <a:t>4</a:t>
             </a:fld>
             <a:endParaRPr lang="en-IN"/>
@@ -2308,7 +2544,7 @@
           <p:cNvPr id="2" name="Slide Image Placeholder 1">
             <a:extLst>
               <a:ext uri="{FF2B5EF4-FFF2-40B4-BE49-F238E27FC236}">
-                <a16:creationId xmlns:a16="http://schemas.microsoft.com/office/drawing/2014/main" id="{68980663-B35F-48B2-8957-64B7E69BB457}"/>
+                <a16:creationId xmlns:a16="http://schemas.microsoft.com/office/drawing/2014/main" id="{35BDD7E8-B5F0-4E36-B1AA-A78F934FB31B}"/>
               </a:ext>
             </a:extLst>
           </p:cNvPr>
@@ -2340,7 +2576,7 @@
           <p:cNvPr id="3" name="Notes Placeholder 2">
             <a:extLst>
               <a:ext uri="{FF2B5EF4-FFF2-40B4-BE49-F238E27FC236}">
-                <a16:creationId xmlns:a16="http://schemas.microsoft.com/office/drawing/2014/main" id="{71D14E6A-E9EA-48E9-A396-EF60144B9A7C}"/>
+                <a16:creationId xmlns:a16="http://schemas.microsoft.com/office/drawing/2014/main" id="{036486D3-4C75-4225-9307-47EDFE26187E}"/>
               </a:ext>
             </a:extLst>
           </p:cNvPr>
@@ -2353,7 +2589,9 @@
         </p:nvSpPr>
         <p:spPr/>
         <p:txBody>
-          <a:bodyPr/>
+          <a:bodyPr>
+            <a:spAutoFit/>
+          </a:bodyPr>
           <a:lstStyle/>
           <a:p>
             <a:endParaRPr lang="en-IN" sz="2000"/>
@@ -2390,7 +2628,7 @@
           <p:cNvPr id="7" name="Slide Number Placeholder 6">
             <a:extLst>
               <a:ext uri="{FF2B5EF4-FFF2-40B4-BE49-F238E27FC236}">
-                <a16:creationId xmlns:a16="http://schemas.microsoft.com/office/drawing/2014/main" id="{CAC6AAFD-CD59-4841-86D0-F7F2412B8BED}"/>
+                <a16:creationId xmlns:a16="http://schemas.microsoft.com/office/drawing/2014/main" id="{DCFEC07E-58FE-4751-897E-3CC0403F2A33}"/>
               </a:ext>
             </a:extLst>
           </p:cNvPr>
@@ -2411,7 +2649,7 @@
           <a:lstStyle/>
           <a:p>
             <a:pPr lvl="0"/>
-            <a:fld id="{BAF2A142-5636-4FEF-AC9E-F583B0E9FB61}" type="slidenum">
+            <a:fld id="{01CF3C0F-0CF6-47C7-8315-4D8543260719}" type="slidenum">
               <a:t>5</a:t>
             </a:fld>
             <a:endParaRPr lang="en-IN"/>
@@ -2423,7 +2661,7 @@
           <p:cNvPr id="2" name="Slide Image Placeholder 1">
             <a:extLst>
               <a:ext uri="{FF2B5EF4-FFF2-40B4-BE49-F238E27FC236}">
-                <a16:creationId xmlns:a16="http://schemas.microsoft.com/office/drawing/2014/main" id="{F64075C8-802C-4EDD-B932-4F9DA36F357E}"/>
+                <a16:creationId xmlns:a16="http://schemas.microsoft.com/office/drawing/2014/main" id="{1BDECF97-9BEF-4E5A-8B02-404CACC8DAD0}"/>
               </a:ext>
             </a:extLst>
           </p:cNvPr>
@@ -2455,7 +2693,7 @@
           <p:cNvPr id="3" name="Notes Placeholder 2">
             <a:extLst>
               <a:ext uri="{FF2B5EF4-FFF2-40B4-BE49-F238E27FC236}">
-                <a16:creationId xmlns:a16="http://schemas.microsoft.com/office/drawing/2014/main" id="{086C35CB-AE58-4F4E-BB44-C6FBA7A233EB}"/>
+                <a16:creationId xmlns:a16="http://schemas.microsoft.com/office/drawing/2014/main" id="{6EFDADC5-9E41-4A8B-B812-8D3B2E2BFF72}"/>
               </a:ext>
             </a:extLst>
           </p:cNvPr>
@@ -2468,7 +2706,9 @@
         </p:nvSpPr>
         <p:spPr/>
         <p:txBody>
-          <a:bodyPr/>
+          <a:bodyPr>
+            <a:spAutoFit/>
+          </a:bodyPr>
           <a:lstStyle/>
           <a:p>
             <a:endParaRPr lang="en-IN" sz="2000"/>
@@ -2505,7 +2745,7 @@
           <p:cNvPr id="7" name="Slide Number Placeholder 6">
             <a:extLst>
               <a:ext uri="{FF2B5EF4-FFF2-40B4-BE49-F238E27FC236}">
-                <a16:creationId xmlns:a16="http://schemas.microsoft.com/office/drawing/2014/main" id="{EDF002E1-2244-4A4F-B953-005741CBC0B0}"/>
+                <a16:creationId xmlns:a16="http://schemas.microsoft.com/office/drawing/2014/main" id="{4FCFB12E-CDE5-40DF-BC82-C37616376F50}"/>
               </a:ext>
             </a:extLst>
           </p:cNvPr>
@@ -2526,7 +2766,7 @@
           <a:lstStyle/>
           <a:p>
             <a:pPr lvl="0"/>
-            <a:fld id="{5118A795-3231-4B20-B2D1-A7AB84E4BFE6}" type="slidenum">
+            <a:fld id="{7417A877-0DF7-42FD-A2B1-BA25DDD7925D}" type="slidenum">
               <a:t>6</a:t>
             </a:fld>
             <a:endParaRPr lang="en-IN"/>
@@ -2538,7 +2778,7 @@
           <p:cNvPr id="2" name="Slide Image Placeholder 1">
             <a:extLst>
               <a:ext uri="{FF2B5EF4-FFF2-40B4-BE49-F238E27FC236}">
-                <a16:creationId xmlns:a16="http://schemas.microsoft.com/office/drawing/2014/main" id="{0E3E6FCC-E12E-42DA-9B87-E973F108E688}"/>
+                <a16:creationId xmlns:a16="http://schemas.microsoft.com/office/drawing/2014/main" id="{14E51C22-E7FB-4F14-8455-63246046BD6D}"/>
               </a:ext>
             </a:extLst>
           </p:cNvPr>
@@ -2570,7 +2810,358 @@
           <p:cNvPr id="3" name="Notes Placeholder 2">
             <a:extLst>
               <a:ext uri="{FF2B5EF4-FFF2-40B4-BE49-F238E27FC236}">
-                <a16:creationId xmlns:a16="http://schemas.microsoft.com/office/drawing/2014/main" id="{A28C6B34-72C2-4881-86F2-DAA6F6E17290}"/>
+                <a16:creationId xmlns:a16="http://schemas.microsoft.com/office/drawing/2014/main" id="{D166AD95-5649-46C6-BA96-E807E53B66E7}"/>
+              </a:ext>
+            </a:extLst>
+          </p:cNvPr>
+          <p:cNvSpPr txBox="1">
+            <a:spLocks noGrp="1"/>
+          </p:cNvSpPr>
+          <p:nvPr>
+            <p:ph type="body" sz="quarter" idx="1"/>
+          </p:nvPr>
+        </p:nvSpPr>
+        <p:spPr/>
+        <p:txBody>
+          <a:bodyPr>
+            <a:spAutoFit/>
+          </a:bodyPr>
+          <a:lstStyle/>
+          <a:p>
+            <a:endParaRPr lang="en-IN" sz="2000"/>
+          </a:p>
+        </p:txBody>
+      </p:sp>
+    </p:spTree>
+  </p:cSld>
+  <p:clrMapOvr>
+    <a:masterClrMapping/>
+  </p:clrMapOvr>
+</p:notes>
+</file>
+
+<file path=ppt/notesSlides/notesSlide7.xml><?xml version="1.0" encoding="utf-8"?>
+<p:notes xmlns:a="http://schemas.openxmlformats.org/drawingml/2006/main" xmlns:r="http://schemas.openxmlformats.org/officeDocument/2006/relationships" xmlns:p="http://schemas.openxmlformats.org/presentationml/2006/main">
+  <p:cSld>
+    <p:spTree>
+      <p:nvGrpSpPr>
+        <p:cNvPr id="1" name=""/>
+        <p:cNvGrpSpPr/>
+        <p:nvPr/>
+      </p:nvGrpSpPr>
+      <p:grpSpPr>
+        <a:xfrm>
+          <a:off x="0" y="0"/>
+          <a:ext cx="0" cy="0"/>
+          <a:chOff x="0" y="0"/>
+          <a:chExt cx="0" cy="0"/>
+        </a:xfrm>
+      </p:grpSpPr>
+      <p:sp>
+        <p:nvSpPr>
+          <p:cNvPr id="7" name="Slide Number Placeholder 6">
+            <a:extLst>
+              <a:ext uri="{FF2B5EF4-FFF2-40B4-BE49-F238E27FC236}">
+                <a16:creationId xmlns:a16="http://schemas.microsoft.com/office/drawing/2014/main" id="{AC909474-272F-4ABC-9C36-A88DA9DAFEFD}"/>
+              </a:ext>
+            </a:extLst>
+          </p:cNvPr>
+          <p:cNvSpPr txBox="1">
+            <a:spLocks noGrp="1"/>
+          </p:cNvSpPr>
+          <p:nvPr>
+            <p:ph type="sldNum" sz="quarter" idx="5"/>
+          </p:nvPr>
+        </p:nvSpPr>
+        <p:spPr>
+          <a:ln/>
+        </p:spPr>
+        <p:txBody>
+          <a:bodyPr lIns="0" tIns="0" rIns="0" bIns="0" anchor="b" anchorCtr="0">
+            <a:noAutofit/>
+          </a:bodyPr>
+          <a:lstStyle/>
+          <a:p>
+            <a:pPr lvl="0"/>
+            <a:fld id="{7B0D0D4C-46B2-4614-8823-5A718BF9D7D4}" type="slidenum">
+              <a:t>7</a:t>
+            </a:fld>
+            <a:endParaRPr lang="en-IN"/>
+          </a:p>
+        </p:txBody>
+      </p:sp>
+      <p:sp>
+        <p:nvSpPr>
+          <p:cNvPr id="2" name="Slide Image Placeholder 1">
+            <a:extLst>
+              <a:ext uri="{FF2B5EF4-FFF2-40B4-BE49-F238E27FC236}">
+                <a16:creationId xmlns:a16="http://schemas.microsoft.com/office/drawing/2014/main" id="{7A158262-3874-41C4-9DE9-361C2EDD1552}"/>
+              </a:ext>
+            </a:extLst>
+          </p:cNvPr>
+          <p:cNvSpPr>
+            <a:spLocks noGrp="1" noRot="1" noChangeAspect="1" noResize="1"/>
+          </p:cNvSpPr>
+          <p:nvPr>
+            <p:ph type="sldImg"/>
+          </p:nvPr>
+        </p:nvSpPr>
+        <p:spPr>
+          <a:xfrm>
+            <a:off x="1106488" y="812800"/>
+            <a:ext cx="5345112" cy="4008438"/>
+          </a:xfrm>
+          <a:solidFill>
+            <a:srgbClr val="729FCF"/>
+          </a:solidFill>
+          <a:ln w="25400">
+            <a:solidFill>
+              <a:srgbClr val="3465AF"/>
+            </a:solidFill>
+            <a:prstDash val="solid"/>
+          </a:ln>
+        </p:spPr>
+      </p:sp>
+      <p:sp>
+        <p:nvSpPr>
+          <p:cNvPr id="3" name="Notes Placeholder 2">
+            <a:extLst>
+              <a:ext uri="{FF2B5EF4-FFF2-40B4-BE49-F238E27FC236}">
+                <a16:creationId xmlns:a16="http://schemas.microsoft.com/office/drawing/2014/main" id="{9F01311E-8E34-4723-8DFA-C1F1965FD0EB}"/>
+              </a:ext>
+            </a:extLst>
+          </p:cNvPr>
+          <p:cNvSpPr txBox="1">
+            <a:spLocks noGrp="1"/>
+          </p:cNvSpPr>
+          <p:nvPr>
+            <p:ph type="body" sz="quarter" idx="1"/>
+          </p:nvPr>
+        </p:nvSpPr>
+        <p:spPr/>
+        <p:txBody>
+          <a:bodyPr>
+            <a:spAutoFit/>
+          </a:bodyPr>
+          <a:lstStyle/>
+          <a:p>
+            <a:endParaRPr lang="en-IN" sz="2000"/>
+          </a:p>
+        </p:txBody>
+      </p:sp>
+    </p:spTree>
+  </p:cSld>
+  <p:clrMapOvr>
+    <a:masterClrMapping/>
+  </p:clrMapOvr>
+</p:notes>
+</file>
+
+<file path=ppt/notesSlides/notesSlide8.xml><?xml version="1.0" encoding="utf-8"?>
+<p:notes xmlns:a="http://schemas.openxmlformats.org/drawingml/2006/main" xmlns:r="http://schemas.openxmlformats.org/officeDocument/2006/relationships" xmlns:p="http://schemas.openxmlformats.org/presentationml/2006/main">
+  <p:cSld>
+    <p:spTree>
+      <p:nvGrpSpPr>
+        <p:cNvPr id="1" name=""/>
+        <p:cNvGrpSpPr/>
+        <p:nvPr/>
+      </p:nvGrpSpPr>
+      <p:grpSpPr>
+        <a:xfrm>
+          <a:off x="0" y="0"/>
+          <a:ext cx="0" cy="0"/>
+          <a:chOff x="0" y="0"/>
+          <a:chExt cx="0" cy="0"/>
+        </a:xfrm>
+      </p:grpSpPr>
+      <p:sp>
+        <p:nvSpPr>
+          <p:cNvPr id="7" name="Slide Number Placeholder 6">
+            <a:extLst>
+              <a:ext uri="{FF2B5EF4-FFF2-40B4-BE49-F238E27FC236}">
+                <a16:creationId xmlns:a16="http://schemas.microsoft.com/office/drawing/2014/main" id="{F96B5709-D1E0-4F29-B58B-7393298DF401}"/>
+              </a:ext>
+            </a:extLst>
+          </p:cNvPr>
+          <p:cNvSpPr txBox="1">
+            <a:spLocks noGrp="1"/>
+          </p:cNvSpPr>
+          <p:nvPr>
+            <p:ph type="sldNum" sz="quarter" idx="5"/>
+          </p:nvPr>
+        </p:nvSpPr>
+        <p:spPr>
+          <a:ln/>
+        </p:spPr>
+        <p:txBody>
+          <a:bodyPr lIns="0" tIns="0" rIns="0" bIns="0" anchor="b" anchorCtr="0">
+            <a:noAutofit/>
+          </a:bodyPr>
+          <a:lstStyle/>
+          <a:p>
+            <a:pPr lvl="0"/>
+            <a:fld id="{09A38D68-9882-4F76-9F07-700A3DE1081A}" type="slidenum">
+              <a:t>8</a:t>
+            </a:fld>
+            <a:endParaRPr lang="en-IN"/>
+          </a:p>
+        </p:txBody>
+      </p:sp>
+      <p:sp>
+        <p:nvSpPr>
+          <p:cNvPr id="2" name="Slide Image Placeholder 1">
+            <a:extLst>
+              <a:ext uri="{FF2B5EF4-FFF2-40B4-BE49-F238E27FC236}">
+                <a16:creationId xmlns:a16="http://schemas.microsoft.com/office/drawing/2014/main" id="{045A07A4-DC07-453D-A594-9ADF48D1F65C}"/>
+              </a:ext>
+            </a:extLst>
+          </p:cNvPr>
+          <p:cNvSpPr>
+            <a:spLocks noGrp="1" noRot="1" noChangeAspect="1" noResize="1"/>
+          </p:cNvSpPr>
+          <p:nvPr>
+            <p:ph type="sldImg"/>
+          </p:nvPr>
+        </p:nvSpPr>
+        <p:spPr>
+          <a:xfrm>
+            <a:off x="1106488" y="812800"/>
+            <a:ext cx="5345112" cy="4008438"/>
+          </a:xfrm>
+          <a:solidFill>
+            <a:srgbClr val="729FCF"/>
+          </a:solidFill>
+          <a:ln w="25400">
+            <a:solidFill>
+              <a:srgbClr val="3465AF"/>
+            </a:solidFill>
+            <a:prstDash val="solid"/>
+          </a:ln>
+        </p:spPr>
+      </p:sp>
+      <p:sp>
+        <p:nvSpPr>
+          <p:cNvPr id="3" name="Notes Placeholder 2">
+            <a:extLst>
+              <a:ext uri="{FF2B5EF4-FFF2-40B4-BE49-F238E27FC236}">
+                <a16:creationId xmlns:a16="http://schemas.microsoft.com/office/drawing/2014/main" id="{B31EF5B8-86E3-47F7-80EE-FEEE5575705A}"/>
+              </a:ext>
+            </a:extLst>
+          </p:cNvPr>
+          <p:cNvSpPr txBox="1">
+            <a:spLocks noGrp="1"/>
+          </p:cNvSpPr>
+          <p:nvPr>
+            <p:ph type="body" sz="quarter" idx="1"/>
+          </p:nvPr>
+        </p:nvSpPr>
+        <p:spPr/>
+        <p:txBody>
+          <a:bodyPr>
+            <a:spAutoFit/>
+          </a:bodyPr>
+          <a:lstStyle/>
+          <a:p>
+            <a:endParaRPr lang="en-IN" sz="2000"/>
+          </a:p>
+        </p:txBody>
+      </p:sp>
+    </p:spTree>
+  </p:cSld>
+  <p:clrMapOvr>
+    <a:masterClrMapping/>
+  </p:clrMapOvr>
+</p:notes>
+</file>
+
+<file path=ppt/notesSlides/notesSlide9.xml><?xml version="1.0" encoding="utf-8"?>
+<p:notes xmlns:a="http://schemas.openxmlformats.org/drawingml/2006/main" xmlns:r="http://schemas.openxmlformats.org/officeDocument/2006/relationships" xmlns:p="http://schemas.openxmlformats.org/presentationml/2006/main">
+  <p:cSld>
+    <p:spTree>
+      <p:nvGrpSpPr>
+        <p:cNvPr id="1" name=""/>
+        <p:cNvGrpSpPr/>
+        <p:nvPr/>
+      </p:nvGrpSpPr>
+      <p:grpSpPr>
+        <a:xfrm>
+          <a:off x="0" y="0"/>
+          <a:ext cx="0" cy="0"/>
+          <a:chOff x="0" y="0"/>
+          <a:chExt cx="0" cy="0"/>
+        </a:xfrm>
+      </p:grpSpPr>
+      <p:sp>
+        <p:nvSpPr>
+          <p:cNvPr id="7" name="Slide Number Placeholder 6">
+            <a:extLst>
+              <a:ext uri="{FF2B5EF4-FFF2-40B4-BE49-F238E27FC236}">
+                <a16:creationId xmlns:a16="http://schemas.microsoft.com/office/drawing/2014/main" id="{0E0196FB-F2C8-449C-880D-ABD33A93166C}"/>
+              </a:ext>
+            </a:extLst>
+          </p:cNvPr>
+          <p:cNvSpPr txBox="1">
+            <a:spLocks noGrp="1"/>
+          </p:cNvSpPr>
+          <p:nvPr>
+            <p:ph type="sldNum" sz="quarter" idx="5"/>
+          </p:nvPr>
+        </p:nvSpPr>
+        <p:spPr>
+          <a:ln/>
+        </p:spPr>
+        <p:txBody>
+          <a:bodyPr lIns="0" tIns="0" rIns="0" bIns="0" anchor="b" anchorCtr="0">
+            <a:noAutofit/>
+          </a:bodyPr>
+          <a:lstStyle/>
+          <a:p>
+            <a:pPr lvl="0"/>
+            <a:fld id="{A168A4A5-757A-4414-B1A1-273AE331BA64}" type="slidenum">
+              <a:t>9</a:t>
+            </a:fld>
+            <a:endParaRPr lang="en-IN"/>
+          </a:p>
+        </p:txBody>
+      </p:sp>
+      <p:sp>
+        <p:nvSpPr>
+          <p:cNvPr id="2" name="Slide Image Placeholder 1">
+            <a:extLst>
+              <a:ext uri="{FF2B5EF4-FFF2-40B4-BE49-F238E27FC236}">
+                <a16:creationId xmlns:a16="http://schemas.microsoft.com/office/drawing/2014/main" id="{68980663-B35F-48B2-8957-64B7E69BB457}"/>
+              </a:ext>
+            </a:extLst>
+          </p:cNvPr>
+          <p:cNvSpPr>
+            <a:spLocks noGrp="1" noRot="1" noChangeAspect="1" noResize="1"/>
+          </p:cNvSpPr>
+          <p:nvPr>
+            <p:ph type="sldImg"/>
+          </p:nvPr>
+        </p:nvSpPr>
+        <p:spPr>
+          <a:xfrm>
+            <a:off x="1106488" y="812800"/>
+            <a:ext cx="5345112" cy="4008438"/>
+          </a:xfrm>
+          <a:solidFill>
+            <a:srgbClr val="729FCF"/>
+          </a:solidFill>
+          <a:ln w="25400">
+            <a:solidFill>
+              <a:srgbClr val="3465AF"/>
+            </a:solidFill>
+            <a:prstDash val="solid"/>
+          </a:ln>
+        </p:spPr>
+      </p:sp>
+      <p:sp>
+        <p:nvSpPr>
+          <p:cNvPr id="3" name="Notes Placeholder 2">
+            <a:extLst>
+              <a:ext uri="{FF2B5EF4-FFF2-40B4-BE49-F238E27FC236}">
+                <a16:creationId xmlns:a16="http://schemas.microsoft.com/office/drawing/2014/main" id="{71D14E6A-E9EA-48E9-A396-EF60144B9A7C}"/>
               </a:ext>
             </a:extLst>
           </p:cNvPr>
@@ -9409,7 +10000,7 @@
 
 <file path=ppt/slides/slide10.xml><?xml version="1.0" encoding="utf-8"?>
 <p:sld xmlns:a="http://schemas.openxmlformats.org/drawingml/2006/main" xmlns:r="http://schemas.openxmlformats.org/officeDocument/2006/relationships" xmlns:p="http://schemas.openxmlformats.org/presentationml/2006/main">
-  <p:cSld>
+  <p:cSld name="page15">
     <p:spTree>
       <p:nvGrpSpPr>
         <p:cNvPr id="1" name=""/>
@@ -9424,133 +10015,155 @@
           <a:chExt cx="0" cy="0"/>
         </a:xfrm>
       </p:grpSpPr>
-      <p:sp>
-        <p:nvSpPr>
-          <p:cNvPr id="2" name="Title 1">
-            <a:extLst>
-              <a:ext uri="{FF2B5EF4-FFF2-40B4-BE49-F238E27FC236}">
-                <a16:creationId xmlns:a16="http://schemas.microsoft.com/office/drawing/2014/main" id="{E0A21536-73B6-41A6-8E76-92160A5F5B30}"/>
-              </a:ext>
-            </a:extLst>
-          </p:cNvPr>
-          <p:cNvSpPr>
-            <a:spLocks noGrp="1"/>
-          </p:cNvSpPr>
-          <p:nvPr>
-            <p:ph type="title"/>
-          </p:nvPr>
-        </p:nvSpPr>
-        <p:spPr/>
-        <p:txBody>
-          <a:bodyPr/>
-          <a:lstStyle/>
-          <a:p>
-            <a:r>
-              <a:rPr lang="en-US" dirty="0"/>
-              <a:t>Data Preprocessing (contd.)</a:t>
-            </a:r>
-            <a:endParaRPr lang="en-IN" dirty="0"/>
-          </a:p>
-        </p:txBody>
-      </p:sp>
-      <p:sp>
-        <p:nvSpPr>
-          <p:cNvPr id="3" name="Content Placeholder 2">
-            <a:extLst>
-              <a:ext uri="{FF2B5EF4-FFF2-40B4-BE49-F238E27FC236}">
-                <a16:creationId xmlns:a16="http://schemas.microsoft.com/office/drawing/2014/main" id="{A24CE5B2-822D-4C1A-83F1-C8C4361CF3CB}"/>
-              </a:ext>
-            </a:extLst>
-          </p:cNvPr>
-          <p:cNvSpPr>
-            <a:spLocks noGrp="1"/>
-          </p:cNvSpPr>
-          <p:nvPr>
-            <p:ph idx="1"/>
-          </p:nvPr>
-        </p:nvSpPr>
+      <p:pic>
+        <p:nvPicPr>
+          <p:cNvPr id="2" name="Picture 1">
+            <a:extLst>
+              <a:ext uri="{FF2B5EF4-FFF2-40B4-BE49-F238E27FC236}">
+                <a16:creationId xmlns:a16="http://schemas.microsoft.com/office/drawing/2014/main" id="{30D47C88-7C63-4885-9888-325CF69DEF71}"/>
+              </a:ext>
+            </a:extLst>
+          </p:cNvPr>
+          <p:cNvPicPr>
+            <a:picLocks noChangeAspect="1"/>
+          </p:cNvPicPr>
+          <p:nvPr/>
+        </p:nvPicPr>
+        <p:blipFill>
+          <a:blip r:embed="rId3">
+            <a:lum/>
+            <a:alphaModFix/>
+          </a:blip>
+          <a:srcRect/>
+          <a:stretch>
+            <a:fillRect/>
+          </a:stretch>
+        </p:blipFill>
         <p:spPr>
           <a:xfrm>
-            <a:off x="720312" y="1687728"/>
-            <a:ext cx="8640000" cy="4384800"/>
+            <a:off x="648000" y="16559"/>
+            <a:ext cx="4927122" cy="3763277"/>
           </a:xfrm>
+          <a:prstGeom prst="rect">
+            <a:avLst/>
+          </a:prstGeom>
+          <a:noFill/>
+          <a:ln>
+            <a:noFill/>
+          </a:ln>
         </p:spPr>
-        <p:txBody>
-          <a:bodyPr/>
-          <a:lstStyle/>
-          <a:p>
-            <a:pPr marL="457200" indent="-457200">
-              <a:buFont typeface="Arial" panose="020B0604020202020204" pitchFamily="34" charset="0"/>
-              <a:buChar char="•"/>
-            </a:pPr>
-            <a:r>
-              <a:rPr lang="en-US" dirty="0"/>
-              <a:t>Upon calculation of all the necessary features, we will then need to assimilate everything into a single dataset.</a:t>
-            </a:r>
-          </a:p>
-          <a:p>
-            <a:pPr marL="457200" indent="-457200">
-              <a:buFont typeface="Arial" panose="020B0604020202020204" pitchFamily="34" charset="0"/>
-              <a:buChar char="•"/>
-            </a:pPr>
-            <a:r>
-              <a:rPr lang="en-US" dirty="0"/>
-              <a:t>Thus, I took all the [ticker symbols, date, open, close] features into a separate </a:t>
-            </a:r>
-            <a:r>
-              <a:rPr lang="en-US" dirty="0" err="1"/>
-              <a:t>dataframe</a:t>
-            </a:r>
-            <a:r>
-              <a:rPr lang="en-US" dirty="0"/>
-              <a:t> and appended it with the features extracted from sentiment analysis.</a:t>
-            </a:r>
-          </a:p>
-          <a:p>
-            <a:pPr marL="457200" indent="-457200">
-              <a:buFont typeface="Arial" panose="020B0604020202020204" pitchFamily="34" charset="0"/>
-              <a:buChar char="•"/>
-            </a:pPr>
-            <a:r>
-              <a:rPr lang="en-US" dirty="0"/>
-              <a:t>To preserve the order of date, we took a </a:t>
-            </a:r>
-            <a:r>
-              <a:rPr lang="en-US" dirty="0" err="1"/>
-              <a:t>datetime.timetuple</a:t>
-            </a:r>
-            <a:r>
-              <a:rPr lang="en-US" dirty="0"/>
-              <a:t>() and extracted the day number of the year using the </a:t>
-            </a:r>
-            <a:r>
-              <a:rPr lang="en-US" dirty="0" err="1"/>
-              <a:t>tm_yday</a:t>
-            </a:r>
-            <a:r>
-              <a:rPr lang="en-US" dirty="0"/>
-              <a:t> parameter. </a:t>
-            </a:r>
-          </a:p>
-          <a:p>
-            <a:pPr marL="457200" indent="-457200">
-              <a:buFont typeface="Arial" panose="020B0604020202020204" pitchFamily="34" charset="0"/>
-              <a:buChar char="•"/>
-            </a:pPr>
-            <a:r>
-              <a:rPr lang="en-US" dirty="0"/>
-              <a:t>Therefore, the final processed dataset before training is of the shape (21286,6)</a:t>
-            </a:r>
-            <a:endParaRPr lang="en-IN" dirty="0"/>
+      </p:pic>
+      <p:pic>
+        <p:nvPicPr>
+          <p:cNvPr id="3" name="Picture 2">
+            <a:extLst>
+              <a:ext uri="{FF2B5EF4-FFF2-40B4-BE49-F238E27FC236}">
+                <a16:creationId xmlns:a16="http://schemas.microsoft.com/office/drawing/2014/main" id="{E8282192-1BD8-4045-BF85-616EB88F7DA3}"/>
+              </a:ext>
+            </a:extLst>
+          </p:cNvPr>
+          <p:cNvPicPr>
+            <a:picLocks noChangeAspect="1"/>
+          </p:cNvPicPr>
+          <p:nvPr/>
+        </p:nvPicPr>
+        <p:blipFill>
+          <a:blip r:embed="rId4">
+            <a:lum/>
+            <a:alphaModFix/>
+          </a:blip>
+          <a:srcRect/>
+          <a:stretch>
+            <a:fillRect/>
+          </a:stretch>
+        </p:blipFill>
+        <p:spPr>
+          <a:xfrm>
+            <a:off x="2647278" y="3779836"/>
+            <a:ext cx="7432721" cy="3753524"/>
+          </a:xfrm>
+          <a:prstGeom prst="rect">
+            <a:avLst/>
+          </a:prstGeom>
+          <a:noFill/>
+          <a:ln>
+            <a:noFill/>
+          </a:ln>
+        </p:spPr>
+      </p:pic>
+      <p:sp>
+        <p:nvSpPr>
+          <p:cNvPr id="5" name="TextBox 4">
+            <a:extLst>
+              <a:ext uri="{FF2B5EF4-FFF2-40B4-BE49-F238E27FC236}">
+                <a16:creationId xmlns:a16="http://schemas.microsoft.com/office/drawing/2014/main" id="{9B1FCB55-B132-4FB3-8E30-7EEFB9AF83AD}"/>
+              </a:ext>
+            </a:extLst>
+          </p:cNvPr>
+          <p:cNvSpPr txBox="1"/>
+          <p:nvPr/>
+        </p:nvSpPr>
+        <p:spPr>
+          <a:xfrm>
+            <a:off x="6060813" y="968827"/>
+            <a:ext cx="3004457" cy="830997"/>
+          </a:xfrm>
+          <a:prstGeom prst="rect">
+            <a:avLst/>
+          </a:prstGeom>
+          <a:noFill/>
+        </p:spPr>
+        <p:txBody>
+          <a:bodyPr wrap="square" rtlCol="0">
+            <a:spAutoFit/>
+          </a:bodyPr>
+          <a:lstStyle/>
+          <a:p>
+            <a:r>
+              <a:rPr lang="en-US" sz="1600" dirty="0"/>
+              <a:t>Apple Stock trend – returns graphed for the scraped time period by standardized formula</a:t>
+            </a:r>
+            <a:endParaRPr lang="en-IN" sz="1600" dirty="0"/>
+          </a:p>
+        </p:txBody>
+      </p:sp>
+      <p:sp>
+        <p:nvSpPr>
+          <p:cNvPr id="6" name="TextBox 5">
+            <a:extLst>
+              <a:ext uri="{FF2B5EF4-FFF2-40B4-BE49-F238E27FC236}">
+                <a16:creationId xmlns:a16="http://schemas.microsoft.com/office/drawing/2014/main" id="{F50CD191-4F2A-4308-920C-C3D14B12E46F}"/>
+              </a:ext>
+            </a:extLst>
+          </p:cNvPr>
+          <p:cNvSpPr txBox="1"/>
+          <p:nvPr/>
+        </p:nvSpPr>
+        <p:spPr>
+          <a:xfrm>
+            <a:off x="107104" y="5656598"/>
+            <a:ext cx="3004457" cy="584775"/>
+          </a:xfrm>
+          <a:prstGeom prst="rect">
+            <a:avLst/>
+          </a:prstGeom>
+          <a:noFill/>
+        </p:spPr>
+        <p:txBody>
+          <a:bodyPr wrap="square" rtlCol="0">
+            <a:spAutoFit/>
+          </a:bodyPr>
+          <a:lstStyle/>
+          <a:p>
+            <a:r>
+              <a:rPr lang="en-US" sz="1600" dirty="0"/>
+              <a:t>Correlation between Apple and Google stock</a:t>
+            </a:r>
+            <a:endParaRPr lang="en-IN" sz="1600" dirty="0"/>
           </a:p>
         </p:txBody>
       </p:sp>
     </p:spTree>
-    <p:extLst>
-      <p:ext uri="{BB962C8B-B14F-4D97-AF65-F5344CB8AC3E}">
-        <p14:creationId xmlns:p14="http://schemas.microsoft.com/office/powerpoint/2010/main" val="4135502000"/>
-      </p:ext>
-    </p:extLst>
   </p:cSld>
   <p:clrMapOvr>
     <a:masterClrMapping/>
@@ -9560,7 +10173,7 @@
 
 <file path=ppt/slides/slide11.xml><?xml version="1.0" encoding="utf-8"?>
 <p:sld xmlns:a="http://schemas.openxmlformats.org/drawingml/2006/main" xmlns:r="http://schemas.openxmlformats.org/officeDocument/2006/relationships" xmlns:p="http://schemas.openxmlformats.org/presentationml/2006/main">
-  <p:cSld>
+  <p:cSld name="page16">
     <p:spTree>
       <p:nvGrpSpPr>
         <p:cNvPr id="1" name=""/>
@@ -9575,94 +10188,81 @@
           <a:chExt cx="0" cy="0"/>
         </a:xfrm>
       </p:grpSpPr>
-      <p:sp>
-        <p:nvSpPr>
-          <p:cNvPr id="2" name="Title 1">
-            <a:extLst>
-              <a:ext uri="{FF2B5EF4-FFF2-40B4-BE49-F238E27FC236}">
-                <a16:creationId xmlns:a16="http://schemas.microsoft.com/office/drawing/2014/main" id="{3424C4CC-D47E-42A8-8659-E4D65EB8837E}"/>
-              </a:ext>
-            </a:extLst>
-          </p:cNvPr>
-          <p:cNvSpPr>
-            <a:spLocks noGrp="1"/>
-          </p:cNvSpPr>
-          <p:nvPr>
-            <p:ph type="title"/>
-          </p:nvPr>
-        </p:nvSpPr>
-        <p:spPr/>
-        <p:txBody>
-          <a:bodyPr/>
-          <a:lstStyle/>
-          <a:p>
-            <a:r>
-              <a:rPr lang="en-US" dirty="0"/>
-              <a:t>Machine Learning Models</a:t>
-            </a:r>
-            <a:endParaRPr lang="en-IN" dirty="0"/>
-          </a:p>
-        </p:txBody>
-      </p:sp>
-      <p:sp>
-        <p:nvSpPr>
-          <p:cNvPr id="3" name="Content Placeholder 2">
-            <a:extLst>
-              <a:ext uri="{FF2B5EF4-FFF2-40B4-BE49-F238E27FC236}">
-                <a16:creationId xmlns:a16="http://schemas.microsoft.com/office/drawing/2014/main" id="{5E4F102B-311E-47AF-8DBB-A6F72F6A2C84}"/>
-              </a:ext>
-            </a:extLst>
-          </p:cNvPr>
-          <p:cNvSpPr>
-            <a:spLocks noGrp="1"/>
-          </p:cNvSpPr>
-          <p:nvPr>
-            <p:ph idx="1"/>
-          </p:nvPr>
-        </p:nvSpPr>
-        <p:spPr/>
-        <p:txBody>
-          <a:bodyPr/>
-          <a:lstStyle/>
-          <a:p>
-            <a:pPr marL="457200" indent="-457200">
-              <a:buFont typeface="Arial" panose="020B0604020202020204" pitchFamily="34" charset="0"/>
-              <a:buChar char="•"/>
-            </a:pPr>
-            <a:r>
-              <a:rPr lang="en-US" dirty="0"/>
-              <a:t>Baseline testing – Though our aim is to set this project on a deep learning model, we created some machine learning regression models to get a baseline measurements. </a:t>
-            </a:r>
-          </a:p>
-          <a:p>
-            <a:pPr marL="457200" indent="-457200">
-              <a:buFont typeface="Arial" panose="020B0604020202020204" pitchFamily="34" charset="0"/>
-              <a:buChar char="•"/>
-            </a:pPr>
-            <a:r>
-              <a:rPr lang="en-US" dirty="0"/>
-              <a:t>This will help us to fine tune our DNN to achieve realistic and great RMSE (metric used here) values.</a:t>
-            </a:r>
-          </a:p>
-          <a:p>
-            <a:pPr marL="457200" indent="-457200">
-              <a:buFont typeface="Arial" panose="020B0604020202020204" pitchFamily="34" charset="0"/>
-              <a:buChar char="•"/>
-            </a:pPr>
-            <a:r>
-              <a:rPr lang="en-US" dirty="0"/>
-              <a:t>As DNN work on a somewhat different principle, we will be focusing on loss and cost function minimization.   </a:t>
-            </a:r>
-            <a:endParaRPr lang="en-IN" dirty="0"/>
+      <p:pic>
+        <p:nvPicPr>
+          <p:cNvPr id="2" name="Picture 1">
+            <a:extLst>
+              <a:ext uri="{FF2B5EF4-FFF2-40B4-BE49-F238E27FC236}">
+                <a16:creationId xmlns:a16="http://schemas.microsoft.com/office/drawing/2014/main" id="{B07515F3-F6F9-42DB-900A-E694F13D8A9D}"/>
+              </a:ext>
+            </a:extLst>
+          </p:cNvPr>
+          <p:cNvPicPr>
+            <a:picLocks noChangeAspect="1"/>
+          </p:cNvPicPr>
+          <p:nvPr/>
+        </p:nvPicPr>
+        <p:blipFill>
+          <a:blip r:embed="rId3">
+            <a:lum/>
+            <a:alphaModFix/>
+          </a:blip>
+          <a:srcRect/>
+          <a:stretch>
+            <a:fillRect/>
+          </a:stretch>
+        </p:blipFill>
+        <p:spPr>
+          <a:xfrm>
+            <a:off x="2641585" y="0"/>
+            <a:ext cx="7439040" cy="6696000"/>
+          </a:xfrm>
+          <a:prstGeom prst="rect">
+            <a:avLst/>
+          </a:prstGeom>
+          <a:noFill/>
+          <a:ln>
+            <a:noFill/>
+          </a:ln>
+        </p:spPr>
+      </p:pic>
+      <p:sp>
+        <p:nvSpPr>
+          <p:cNvPr id="4" name="TextBox 3">
+            <a:extLst>
+              <a:ext uri="{FF2B5EF4-FFF2-40B4-BE49-F238E27FC236}">
+                <a16:creationId xmlns:a16="http://schemas.microsoft.com/office/drawing/2014/main" id="{7285603A-BC4C-4064-8DC7-96BAB555B290}"/>
+              </a:ext>
+            </a:extLst>
+          </p:cNvPr>
+          <p:cNvSpPr txBox="1"/>
+          <p:nvPr/>
+        </p:nvSpPr>
+        <p:spPr>
+          <a:xfrm>
+            <a:off x="95441" y="3156856"/>
+            <a:ext cx="3004457" cy="584775"/>
+          </a:xfrm>
+          <a:prstGeom prst="rect">
+            <a:avLst/>
+          </a:prstGeom>
+          <a:noFill/>
+        </p:spPr>
+        <p:txBody>
+          <a:bodyPr wrap="square" rtlCol="0">
+            <a:spAutoFit/>
+          </a:bodyPr>
+          <a:lstStyle/>
+          <a:p>
+            <a:r>
+              <a:rPr lang="en-US" sz="1600" dirty="0"/>
+              <a:t>Correlation Scatter Matrix between the dominant stocks</a:t>
+            </a:r>
+            <a:endParaRPr lang="en-IN" sz="1600" dirty="0"/>
           </a:p>
         </p:txBody>
       </p:sp>
     </p:spTree>
-    <p:extLst>
-      <p:ext uri="{BB962C8B-B14F-4D97-AF65-F5344CB8AC3E}">
-        <p14:creationId xmlns:p14="http://schemas.microsoft.com/office/powerpoint/2010/main" val="1860498974"/>
-      </p:ext>
-    </p:extLst>
   </p:cSld>
   <p:clrMapOvr>
     <a:masterClrMapping/>
@@ -9692,7 +10292,7 @@
           <p:cNvPr id="2" name="Title 1">
             <a:extLst>
               <a:ext uri="{FF2B5EF4-FFF2-40B4-BE49-F238E27FC236}">
-                <a16:creationId xmlns:a16="http://schemas.microsoft.com/office/drawing/2014/main" id="{1E91B22B-A568-48D6-998A-E3BBAA05A6B6}"/>
+                <a16:creationId xmlns:a16="http://schemas.microsoft.com/office/drawing/2014/main" id="{9668187A-481C-4573-89BC-8AAD466C0841}"/>
               </a:ext>
             </a:extLst>
           </p:cNvPr>
@@ -9710,7 +10310,7 @@
           <a:p>
             <a:r>
               <a:rPr lang="en-US" dirty="0"/>
-              <a:t>Machine Learning Models (contd.)</a:t>
+              <a:t>Text News Extraction</a:t>
             </a:r>
             <a:endParaRPr lang="en-IN" dirty="0"/>
           </a:p>
@@ -9721,7 +10321,7 @@
           <p:cNvPr id="3" name="Content Placeholder 2">
             <a:extLst>
               <a:ext uri="{FF2B5EF4-FFF2-40B4-BE49-F238E27FC236}">
-                <a16:creationId xmlns:a16="http://schemas.microsoft.com/office/drawing/2014/main" id="{4C233E80-DAB1-47B9-A4D8-4FA3E8BBC6CA}"/>
+                <a16:creationId xmlns:a16="http://schemas.microsoft.com/office/drawing/2014/main" id="{75C8A65D-8EE3-4A93-9347-5451A45E2E57}"/>
               </a:ext>
             </a:extLst>
           </p:cNvPr>
@@ -9734,7 +10334,7 @@
         </p:nvSpPr>
         <p:spPr>
           <a:xfrm>
-            <a:off x="720000" y="1818549"/>
+            <a:off x="720000" y="1808307"/>
             <a:ext cx="8640000" cy="4384800"/>
           </a:xfrm>
         </p:spPr>
@@ -9748,7 +10348,7 @@
             </a:pPr>
             <a:r>
               <a:rPr lang="en-US" dirty="0"/>
-              <a:t>For the purpose of setting a benchmark, 4 regression models were used. </a:t>
+              <a:t>Collected data from Reuters and NASDAQ, 2 very popular websites producing finance and stock news. </a:t>
             </a:r>
           </a:p>
           <a:p>
@@ -9758,7 +10358,15 @@
             </a:pPr>
             <a:r>
               <a:rPr lang="en-US" dirty="0"/>
-              <a:t>They are : Linear Regression, Support Vector Regression, Random Forest Regression and Gradient Boost Regression.</a:t>
+              <a:t>Used </a:t>
+            </a:r>
+            <a:r>
+              <a:rPr lang="en-US" dirty="0" err="1"/>
+              <a:t>BeautifulSoup</a:t>
+            </a:r>
+            <a:r>
+              <a:rPr lang="en-US" dirty="0"/>
+              <a:t> to scrape the web pages and stored them into csv files.</a:t>
             </a:r>
           </a:p>
           <a:p>
@@ -9768,10 +10376,44 @@
             </a:pPr>
             <a:r>
               <a:rPr lang="en-US" dirty="0"/>
-              <a:t>Here are the results of a single run, with train test split in the ratio 70 : 30. The models were tested on 2 types of pre processed datasets, one that was simply label encoded and the other that was one hot encoded to take into account the stock tickers as well.</a:t>
-            </a:r>
-          </a:p>
-          <a:p>
+              <a:t>Files named “date” wise, containing all the news published that day by the news sources.</a:t>
+            </a:r>
+          </a:p>
+          <a:p>
+            <a:pPr marL="457200" indent="-457200">
+              <a:buFont typeface="Arial" panose="020B0604020202020204" pitchFamily="34" charset="0"/>
+              <a:buChar char="•"/>
+            </a:pPr>
+            <a:r>
+              <a:rPr lang="en-US" dirty="0"/>
+              <a:t>Each file will have </a:t>
+            </a:r>
+            <a:r>
+              <a:rPr lang="en-US" dirty="0" err="1"/>
+              <a:t>atleast</a:t>
+            </a:r>
+            <a:r>
+              <a:rPr lang="en-US" dirty="0"/>
+              <a:t> 1 news of 1 stock ticker.</a:t>
+            </a:r>
+          </a:p>
+          <a:p>
+            <a:pPr marL="457200" indent="-457200">
+              <a:buFont typeface="Arial" panose="020B0604020202020204" pitchFamily="34" charset="0"/>
+              <a:buChar char="•"/>
+            </a:pPr>
+            <a:r>
+              <a:rPr lang="en-US" dirty="0"/>
+              <a:t>Not necessary that each </a:t>
+            </a:r>
+            <a:r>
+              <a:rPr lang="en-US" dirty="0" err="1"/>
+              <a:t>each</a:t>
+            </a:r>
+            <a:r>
+              <a:rPr lang="en-US" dirty="0"/>
+              <a:t> will have some news on a daily basis</a:t>
+            </a:r>
             <a:endParaRPr lang="en-IN" dirty="0"/>
           </a:p>
         </p:txBody>
@@ -9779,7 +10421,7 @@
     </p:spTree>
     <p:extLst>
       <p:ext uri="{BB962C8B-B14F-4D97-AF65-F5344CB8AC3E}">
-        <p14:creationId xmlns:p14="http://schemas.microsoft.com/office/powerpoint/2010/main" val="1447263693"/>
+        <p14:creationId xmlns:p14="http://schemas.microsoft.com/office/powerpoint/2010/main" val="2714015408"/>
       </p:ext>
     </p:extLst>
   </p:cSld>
@@ -9811,7 +10453,7 @@
           <p:cNvPr id="2" name="Title 1">
             <a:extLst>
               <a:ext uri="{FF2B5EF4-FFF2-40B4-BE49-F238E27FC236}">
-                <a16:creationId xmlns:a16="http://schemas.microsoft.com/office/drawing/2014/main" id="{D18D59E2-0D62-49F7-BC16-3116F31E4A63}"/>
+                <a16:creationId xmlns:a16="http://schemas.microsoft.com/office/drawing/2014/main" id="{AED430CA-1465-48A0-AF4A-4AB0BB59A4F1}"/>
               </a:ext>
             </a:extLst>
           </p:cNvPr>
@@ -9829,75 +10471,97 @@
           <a:p>
             <a:r>
               <a:rPr lang="en-US" dirty="0"/>
-              <a:t>Performance Analysis</a:t>
+              <a:t>Data Preprocessing</a:t>
             </a:r>
             <a:endParaRPr lang="en-IN" dirty="0"/>
           </a:p>
         </p:txBody>
       </p:sp>
-      <p:graphicFrame>
-        <p:nvGraphicFramePr>
-          <p:cNvPr id="4" name="Content Placeholder 3">
-            <a:extLst>
-              <a:ext uri="{FF2B5EF4-FFF2-40B4-BE49-F238E27FC236}">
-                <a16:creationId xmlns:a16="http://schemas.microsoft.com/office/drawing/2014/main" id="{C59030CB-6293-45B6-BA5C-BCF31665DA51}"/>
-              </a:ext>
-            </a:extLst>
-          </p:cNvPr>
-          <p:cNvGraphicFramePr>
-            <a:graphicFrameLocks noGrp="1"/>
-          </p:cNvGraphicFramePr>
+      <p:sp>
+        <p:nvSpPr>
+          <p:cNvPr id="3" name="Content Placeholder 2">
+            <a:extLst>
+              <a:ext uri="{FF2B5EF4-FFF2-40B4-BE49-F238E27FC236}">
+                <a16:creationId xmlns:a16="http://schemas.microsoft.com/office/drawing/2014/main" id="{D504DDDC-1AEB-49D8-A0BD-F63564AB7F12}"/>
+              </a:ext>
+            </a:extLst>
+          </p:cNvPr>
+          <p:cNvSpPr>
+            <a:spLocks noGrp="1"/>
+          </p:cNvSpPr>
           <p:nvPr>
             <p:ph idx="1"/>
-            <p:extLst>
-              <p:ext uri="{D42A27DB-BD31-4B8C-83A1-F6EECF244321}">
-                <p14:modId xmlns:p14="http://schemas.microsoft.com/office/powerpoint/2010/main" val="4088934463"/>
-              </p:ext>
-            </p:extLst>
-          </p:nvPr>
-        </p:nvGraphicFramePr>
-        <p:xfrm>
-          <a:off x="721450" y="1386865"/>
-          <a:ext cx="8639175" cy="4384675"/>
-        </p:xfrm>
-        <a:graphic>
-          <a:graphicData uri="http://schemas.openxmlformats.org/drawingml/2006/chart">
-            <c:chart xmlns:c="http://schemas.openxmlformats.org/drawingml/2006/chart" xmlns:r="http://schemas.openxmlformats.org/officeDocument/2006/relationships" r:id="rId2"/>
-          </a:graphicData>
-        </a:graphic>
-      </p:graphicFrame>
-      <p:sp>
-        <p:nvSpPr>
-          <p:cNvPr id="5" name="TextBox 4">
-            <a:extLst>
-              <a:ext uri="{FF2B5EF4-FFF2-40B4-BE49-F238E27FC236}">
-                <a16:creationId xmlns:a16="http://schemas.microsoft.com/office/drawing/2014/main" id="{599B7819-220C-4320-80BE-F71F996D2A7C}"/>
-              </a:ext>
-            </a:extLst>
-          </p:cNvPr>
-          <p:cNvSpPr txBox="1"/>
-          <p:nvPr/>
+          </p:nvPr>
         </p:nvSpPr>
         <p:spPr>
           <a:xfrm>
-            <a:off x="720000" y="5988818"/>
-            <a:ext cx="7710567" cy="646331"/>
+            <a:off x="720000" y="1748017"/>
+            <a:ext cx="8640000" cy="4384800"/>
           </a:xfrm>
-          <a:prstGeom prst="rect">
-            <a:avLst/>
-          </a:prstGeom>
-          <a:noFill/>
         </p:spPr>
         <p:txBody>
-          <a:bodyPr wrap="square" rtlCol="0">
-            <a:spAutoFit/>
-          </a:bodyPr>
-          <a:lstStyle/>
-          <a:p>
+          <a:bodyPr/>
+          <a:lstStyle/>
+          <a:p>
+            <a:pPr marL="457200" indent="-457200">
+              <a:buFont typeface="Arial" panose="020B0604020202020204" pitchFamily="34" charset="0"/>
+              <a:buChar char="•"/>
+            </a:pPr>
             <a:r>
               <a:rPr lang="en-US" dirty="0"/>
-              <a:t>As we can see, there is a trend that says one hot encoded data usually gives better accuracy. </a:t>
-            </a:r>
+              <a:t>Longest part of the entire project timeline. Still under revisions.</a:t>
+            </a:r>
+          </a:p>
+          <a:p>
+            <a:pPr marL="457200" indent="-457200">
+              <a:buFont typeface="Arial" panose="020B0604020202020204" pitchFamily="34" charset="0"/>
+              <a:buChar char="•"/>
+            </a:pPr>
+            <a:r>
+              <a:rPr lang="en-US" dirty="0"/>
+              <a:t>Rescaled numerical stock data to smaller dimensions, removing all redundant columns thus, leading to dimension reduction from 14 to 8.</a:t>
+            </a:r>
+          </a:p>
+          <a:p>
+            <a:pPr marL="457200" indent="-457200">
+              <a:buFont typeface="Arial" panose="020B0604020202020204" pitchFamily="34" charset="0"/>
+              <a:buChar char="•"/>
+            </a:pPr>
+            <a:r>
+              <a:rPr lang="en-US" dirty="0"/>
+              <a:t>Final stock data used for analytics contains the following columns : [Date, Symbol, High, Low, Open, Close, Volume and </a:t>
+            </a:r>
+            <a:r>
+              <a:rPr lang="en-US" dirty="0" err="1"/>
+              <a:t>AdjClose</a:t>
+            </a:r>
+            <a:r>
+              <a:rPr lang="en-US" dirty="0"/>
+              <a:t>]</a:t>
+            </a:r>
+          </a:p>
+          <a:p>
+            <a:pPr marL="457200" indent="-457200">
+              <a:buFont typeface="Arial" panose="020B0604020202020204" pitchFamily="34" charset="0"/>
+              <a:buChar char="•"/>
+            </a:pPr>
+            <a:r>
+              <a:rPr lang="en-US" dirty="0"/>
+              <a:t>Cleaned text news off random ads by filtering out unnecessary keys in JSON during scraping. </a:t>
+            </a:r>
+          </a:p>
+          <a:p>
+            <a:pPr marL="457200" indent="-457200">
+              <a:buFont typeface="Arial" panose="020B0604020202020204" pitchFamily="34" charset="0"/>
+              <a:buChar char="•"/>
+            </a:pPr>
+            <a:endParaRPr lang="en-US" dirty="0"/>
+          </a:p>
+          <a:p>
+            <a:pPr marL="457200" indent="-457200">
+              <a:buFont typeface="Arial" panose="020B0604020202020204" pitchFamily="34" charset="0"/>
+              <a:buChar char="•"/>
+            </a:pPr>
             <a:endParaRPr lang="en-IN" dirty="0"/>
           </a:p>
         </p:txBody>
@@ -9905,7 +10569,7 @@
     </p:spTree>
     <p:extLst>
       <p:ext uri="{BB962C8B-B14F-4D97-AF65-F5344CB8AC3E}">
-        <p14:creationId xmlns:p14="http://schemas.microsoft.com/office/powerpoint/2010/main" val="823602004"/>
+        <p14:creationId xmlns:p14="http://schemas.microsoft.com/office/powerpoint/2010/main" val="3839025562"/>
       </p:ext>
     </p:extLst>
   </p:cSld>
@@ -9937,7 +10601,7 @@
           <p:cNvPr id="2" name="Title 1">
             <a:extLst>
               <a:ext uri="{FF2B5EF4-FFF2-40B4-BE49-F238E27FC236}">
-                <a16:creationId xmlns:a16="http://schemas.microsoft.com/office/drawing/2014/main" id="{C5F0C98C-D3E5-496D-AA49-B4371F69EAF3}"/>
+                <a16:creationId xmlns:a16="http://schemas.microsoft.com/office/drawing/2014/main" id="{D4661BB8-4FD3-4E0F-AA65-93DD212C479E}"/>
               </a:ext>
             </a:extLst>
           </p:cNvPr>
@@ -9955,7 +10619,7 @@
           <a:p>
             <a:r>
               <a:rPr lang="en-US" dirty="0"/>
-              <a:t>Other work done</a:t>
+              <a:t>Data Preprocessing (contd.)</a:t>
             </a:r>
             <a:endParaRPr lang="en-IN" dirty="0"/>
           </a:p>
@@ -9966,7 +10630,7 @@
           <p:cNvPr id="3" name="Content Placeholder 2">
             <a:extLst>
               <a:ext uri="{FF2B5EF4-FFF2-40B4-BE49-F238E27FC236}">
-                <a16:creationId xmlns:a16="http://schemas.microsoft.com/office/drawing/2014/main" id="{FA4B93AD-53EB-4DC8-B65A-8F283279EF75}"/>
+                <a16:creationId xmlns:a16="http://schemas.microsoft.com/office/drawing/2014/main" id="{BD8A1B46-CE17-4BCA-90FB-261200574E2E}"/>
               </a:ext>
             </a:extLst>
           </p:cNvPr>
@@ -9979,7 +10643,7 @@
         </p:nvSpPr>
         <p:spPr>
           <a:xfrm>
-            <a:off x="720000" y="1948985"/>
+            <a:off x="720000" y="1717873"/>
             <a:ext cx="8640000" cy="4384800"/>
           </a:xfrm>
         </p:spPr>
@@ -9993,7 +10657,7 @@
             </a:pPr>
             <a:r>
               <a:rPr lang="en-US" dirty="0"/>
-              <a:t>Worked on the draft of the research paper, to be submitted in a respectable SCOPUS rated journal.</a:t>
+              <a:t>After curating legible news articles, we then move onto processing that news.</a:t>
             </a:r>
           </a:p>
           <a:p>
@@ -10003,7 +10667,7 @@
             </a:pPr>
             <a:r>
               <a:rPr lang="en-US" dirty="0"/>
-              <a:t>Started developing the neural network code, needs fault testing.</a:t>
+              <a:t>For this, we will use sentiment analysis to calculate a normalized score and a magnitude score. </a:t>
             </a:r>
           </a:p>
           <a:p>
@@ -10013,7 +10677,7 @@
             </a:pPr>
             <a:r>
               <a:rPr lang="en-US" dirty="0"/>
-              <a:t>Extensive comparison and experimentation for paper.</a:t>
+              <a:t>Derived a formula for sentiment magnitude, along with a scaling factor. Preprocessed data for various alphas.</a:t>
             </a:r>
           </a:p>
           <a:p>
@@ -10023,7 +10687,7 @@
             </a:pPr>
             <a:r>
               <a:rPr lang="en-US" dirty="0"/>
-              <a:t>Completing draft of the project thesis.</a:t>
+              <a:t>As discussed back in review 1, this will help in measuring each news articles to determine “what type” of sentiment and “how much” of that sentiment.</a:t>
             </a:r>
           </a:p>
           <a:p>
@@ -10031,6 +10695,10 @@
               <a:buFont typeface="Arial" panose="020B0604020202020204" pitchFamily="34" charset="0"/>
               <a:buChar char="•"/>
             </a:pPr>
+            <a:r>
+              <a:rPr lang="en-US" dirty="0"/>
+              <a:t>This ultimately will help us calculate our loss function for the deep neural network. </a:t>
+            </a:r>
             <a:endParaRPr lang="en-IN" dirty="0"/>
           </a:p>
         </p:txBody>
@@ -10038,7 +10706,7 @@
     </p:spTree>
     <p:extLst>
       <p:ext uri="{BB962C8B-B14F-4D97-AF65-F5344CB8AC3E}">
-        <p14:creationId xmlns:p14="http://schemas.microsoft.com/office/powerpoint/2010/main" val="557982325"/>
+        <p14:creationId xmlns:p14="http://schemas.microsoft.com/office/powerpoint/2010/main" val="224779920"/>
       </p:ext>
     </p:extLst>
   </p:cSld>
@@ -10070,6 +10738,1082 @@
           <p:cNvPr id="2" name="Title 1">
             <a:extLst>
               <a:ext uri="{FF2B5EF4-FFF2-40B4-BE49-F238E27FC236}">
+                <a16:creationId xmlns:a16="http://schemas.microsoft.com/office/drawing/2014/main" id="{6908C9F3-C9EE-450C-BA2E-C389F909C4B6}"/>
+              </a:ext>
+            </a:extLst>
+          </p:cNvPr>
+          <p:cNvSpPr>
+            <a:spLocks noGrp="1"/>
+          </p:cNvSpPr>
+          <p:nvPr>
+            <p:ph type="title"/>
+          </p:nvPr>
+        </p:nvSpPr>
+        <p:spPr/>
+        <p:txBody>
+          <a:bodyPr/>
+          <a:lstStyle/>
+          <a:p>
+            <a:r>
+              <a:rPr lang="en-US" dirty="0"/>
+              <a:t>Data Preprocessing (contd.)</a:t>
+            </a:r>
+            <a:endParaRPr lang="en-IN" dirty="0"/>
+          </a:p>
+        </p:txBody>
+      </p:sp>
+      <mc:AlternateContent xmlns:mc="http://schemas.openxmlformats.org/markup-compatibility/2006" xmlns:a14="http://schemas.microsoft.com/office/drawing/2010/main">
+        <mc:Choice Requires="a14">
+          <p:sp>
+            <p:nvSpPr>
+              <p:cNvPr id="3" name="Content Placeholder 2">
+                <a:extLst>
+                  <a:ext uri="{FF2B5EF4-FFF2-40B4-BE49-F238E27FC236}">
+                    <a16:creationId xmlns:a16="http://schemas.microsoft.com/office/drawing/2014/main" id="{FE5C82A1-5C87-4276-98CE-C142893E8D90}"/>
+                  </a:ext>
+                </a:extLst>
+              </p:cNvPr>
+              <p:cNvSpPr>
+                <a:spLocks noGrp="1"/>
+              </p:cNvSpPr>
+              <p:nvPr>
+                <p:ph idx="1"/>
+              </p:nvPr>
+            </p:nvSpPr>
+            <p:spPr>
+              <a:xfrm>
+                <a:off x="720312" y="1928888"/>
+                <a:ext cx="8640000" cy="4384800"/>
+              </a:xfrm>
+            </p:spPr>
+            <p:txBody>
+              <a:bodyPr/>
+              <a:lstStyle/>
+              <a:p>
+                <a:pPr marL="457200" indent="-457200">
+                  <a:buFont typeface="Arial" panose="020B0604020202020204" pitchFamily="34" charset="0"/>
+                  <a:buChar char="•"/>
+                </a:pPr>
+                <a:r>
+                  <a:rPr lang="en-US" dirty="0"/>
+                  <a:t>The sentiment analysis was done using VADER and </a:t>
+                </a:r>
+                <a:r>
+                  <a:rPr lang="en-US" dirty="0" err="1"/>
+                  <a:t>TextBlob</a:t>
+                </a:r>
+                <a:r>
+                  <a:rPr lang="en-US" dirty="0"/>
+                  <a:t>.</a:t>
+                </a:r>
+              </a:p>
+              <a:p>
+                <a:pPr marL="457200" indent="-457200">
+                  <a:buFont typeface="Arial" panose="020B0604020202020204" pitchFamily="34" charset="0"/>
+                  <a:buChar char="•"/>
+                </a:pPr>
+                <a:r>
+                  <a:rPr lang="en-US" dirty="0"/>
+                  <a:t>Instead of only calculating normalized score, I also calculated the magnitude using the following formula derived from the source code of VADER : </a:t>
+                </a:r>
+                <a14:m>
+                  <m:oMath xmlns:m="http://schemas.openxmlformats.org/officeDocument/2006/math">
+                    <m:rad>
+                      <m:radPr>
+                        <m:degHide m:val="on"/>
+                        <m:ctrlPr>
+                          <a:rPr lang="en-IN" b="1" i="1">
+                            <a:latin typeface="Cambria Math" panose="02040503050406030204" pitchFamily="18" charset="0"/>
+                          </a:rPr>
+                        </m:ctrlPr>
+                      </m:radPr>
+                      <m:deg/>
+                      <m:e>
+                        <m:f>
+                          <m:fPr>
+                            <m:ctrlPr>
+                              <a:rPr lang="en-IN" b="1" i="1">
+                                <a:latin typeface="Cambria Math" panose="02040503050406030204" pitchFamily="18" charset="0"/>
+                              </a:rPr>
+                            </m:ctrlPr>
+                          </m:fPr>
+                          <m:num>
+                            <m:r>
+                              <a:rPr lang="en-IN" b="1" i="1">
+                                <a:latin typeface="Cambria Math" panose="02040503050406030204" pitchFamily="18" charset="0"/>
+                              </a:rPr>
+                              <m:t>𝒔𝒄𝒐𝒓</m:t>
+                            </m:r>
+                            <m:sSubSup>
+                              <m:sSubSupPr>
+                                <m:ctrlPr>
+                                  <a:rPr lang="en-IN" b="1" i="1">
+                                    <a:latin typeface="Cambria Math" panose="02040503050406030204" pitchFamily="18" charset="0"/>
+                                  </a:rPr>
+                                </m:ctrlPr>
+                              </m:sSubSupPr>
+                              <m:e>
+                                <m:r>
+                                  <a:rPr lang="en-IN" b="1" i="1">
+                                    <a:latin typeface="Cambria Math" panose="02040503050406030204" pitchFamily="18" charset="0"/>
+                                  </a:rPr>
+                                  <m:t>𝒆</m:t>
+                                </m:r>
+                              </m:e>
+                              <m:sub>
+                                <m:r>
+                                  <a:rPr lang="en-IN" b="1" i="1">
+                                    <a:latin typeface="Cambria Math" panose="02040503050406030204" pitchFamily="18" charset="0"/>
+                                  </a:rPr>
+                                  <m:t>𝒏𝒐𝒓𝒎</m:t>
+                                </m:r>
+                              </m:sub>
+                              <m:sup>
+                                <m:r>
+                                  <a:rPr lang="en-IN" b="1" i="1">
+                                    <a:latin typeface="Cambria Math" panose="02040503050406030204" pitchFamily="18" charset="0"/>
+                                  </a:rPr>
+                                  <m:t>𝟐</m:t>
+                                </m:r>
+                              </m:sup>
+                            </m:sSubSup>
+                            <m:r>
+                              <a:rPr lang="en-IN" b="1" i="1">
+                                <a:latin typeface="Cambria Math" panose="02040503050406030204" pitchFamily="18" charset="0"/>
+                              </a:rPr>
+                              <m:t>+ </m:t>
+                            </m:r>
+                            <m:r>
+                              <a:rPr lang="en-IN" b="1" i="1">
+                                <a:latin typeface="Cambria Math" panose="02040503050406030204" pitchFamily="18" charset="0"/>
+                              </a:rPr>
+                              <m:t>𝜶</m:t>
+                            </m:r>
+                          </m:num>
+                          <m:den>
+                            <m:r>
+                              <a:rPr lang="en-IN" b="1" i="1">
+                                <a:latin typeface="Cambria Math" panose="02040503050406030204" pitchFamily="18" charset="0"/>
+                              </a:rPr>
+                              <m:t>𝟏</m:t>
+                            </m:r>
+                            <m:r>
+                              <a:rPr lang="en-IN" b="1" i="1">
+                                <a:latin typeface="Cambria Math" panose="02040503050406030204" pitchFamily="18" charset="0"/>
+                              </a:rPr>
+                              <m:t>−</m:t>
+                            </m:r>
+                            <m:r>
+                              <a:rPr lang="en-IN" b="1" i="1">
+                                <a:latin typeface="Cambria Math" panose="02040503050406030204" pitchFamily="18" charset="0"/>
+                              </a:rPr>
+                              <m:t>𝒔𝒄𝒐𝒓</m:t>
+                            </m:r>
+                            <m:sSubSup>
+                              <m:sSubSupPr>
+                                <m:ctrlPr>
+                                  <a:rPr lang="en-IN" b="1" i="1">
+                                    <a:latin typeface="Cambria Math" panose="02040503050406030204" pitchFamily="18" charset="0"/>
+                                  </a:rPr>
+                                </m:ctrlPr>
+                              </m:sSubSupPr>
+                              <m:e>
+                                <m:r>
+                                  <a:rPr lang="en-IN" b="1" i="1">
+                                    <a:latin typeface="Cambria Math" panose="02040503050406030204" pitchFamily="18" charset="0"/>
+                                  </a:rPr>
+                                  <m:t>𝒆</m:t>
+                                </m:r>
+                              </m:e>
+                              <m:sub>
+                                <m:r>
+                                  <a:rPr lang="en-IN" b="1" i="1">
+                                    <a:latin typeface="Cambria Math" panose="02040503050406030204" pitchFamily="18" charset="0"/>
+                                  </a:rPr>
+                                  <m:t>𝒏𝒐𝒓𝒎</m:t>
+                                </m:r>
+                              </m:sub>
+                              <m:sup>
+                                <m:r>
+                                  <a:rPr lang="en-IN" b="1" i="1">
+                                    <a:latin typeface="Cambria Math" panose="02040503050406030204" pitchFamily="18" charset="0"/>
+                                  </a:rPr>
+                                  <m:t>𝟐</m:t>
+                                </m:r>
+                              </m:sup>
+                            </m:sSubSup>
+                          </m:den>
+                        </m:f>
+                      </m:e>
+                    </m:rad>
+                  </m:oMath>
+                </a14:m>
+                <a:endParaRPr lang="en-US" dirty="0"/>
+              </a:p>
+              <a:p>
+                <a:pPr marL="457200" indent="-457200">
+                  <a:buFont typeface="Arial" panose="020B0604020202020204" pitchFamily="34" charset="0"/>
+                  <a:buChar char="•"/>
+                </a:pPr>
+                <a:r>
+                  <a:rPr lang="en-US" dirty="0"/>
+                  <a:t>As one can see, there is a constant alpha. This acts like a scaling factor and this has been used to make multiple datasets  for this project to see the effect of varying alpha during training.</a:t>
+                </a:r>
+              </a:p>
+              <a:p>
+                <a:pPr marL="457200" indent="-457200">
+                  <a:buFont typeface="Arial" panose="020B0604020202020204" pitchFamily="34" charset="0"/>
+                  <a:buChar char="•"/>
+                </a:pPr>
+                <a:endParaRPr lang="en-IN" dirty="0"/>
+              </a:p>
+            </p:txBody>
+          </p:sp>
+        </mc:Choice>
+        <mc:Fallback xmlns="">
+          <p:sp>
+            <p:nvSpPr>
+              <p:cNvPr id="3" name="Content Placeholder 2">
+                <a:extLst>
+                  <a:ext uri="{FF2B5EF4-FFF2-40B4-BE49-F238E27FC236}">
+                    <a16:creationId xmlns:a16="http://schemas.microsoft.com/office/drawing/2014/main" id="{FE5C82A1-5C87-4276-98CE-C142893E8D90}"/>
+                  </a:ext>
+                </a:extLst>
+              </p:cNvPr>
+              <p:cNvSpPr>
+                <a:spLocks noGrp="1" noRot="1" noChangeAspect="1" noMove="1" noResize="1" noEditPoints="1" noAdjustHandles="1" noChangeArrowheads="1" noChangeShapeType="1" noTextEdit="1"/>
+              </p:cNvSpPr>
+              <p:nvPr>
+                <p:ph idx="1"/>
+              </p:nvPr>
+            </p:nvSpPr>
+            <p:spPr>
+              <a:xfrm>
+                <a:off x="720312" y="1928888"/>
+                <a:ext cx="8640000" cy="4384800"/>
+              </a:xfrm>
+              <a:blipFill>
+                <a:blip r:embed="rId2"/>
+                <a:stretch>
+                  <a:fillRect l="-2329" t="-2361" r="-2258" b="-10694"/>
+                </a:stretch>
+              </a:blipFill>
+            </p:spPr>
+            <p:txBody>
+              <a:bodyPr/>
+              <a:lstStyle/>
+              <a:p>
+                <a:r>
+                  <a:rPr lang="en-IN">
+                    <a:noFill/>
+                  </a:rPr>
+                  <a:t> </a:t>
+                </a:r>
+              </a:p>
+            </p:txBody>
+          </p:sp>
+        </mc:Fallback>
+      </mc:AlternateContent>
+    </p:spTree>
+    <p:extLst>
+      <p:ext uri="{BB962C8B-B14F-4D97-AF65-F5344CB8AC3E}">
+        <p14:creationId xmlns:p14="http://schemas.microsoft.com/office/powerpoint/2010/main" val="3280571310"/>
+      </p:ext>
+    </p:extLst>
+  </p:cSld>
+  <p:clrMapOvr>
+    <a:masterClrMapping/>
+  </p:clrMapOvr>
+</p:sld>
+</file>
+
+<file path=ppt/slides/slide16.xml><?xml version="1.0" encoding="utf-8"?>
+<p:sld xmlns:a="http://schemas.openxmlformats.org/drawingml/2006/main" xmlns:r="http://schemas.openxmlformats.org/officeDocument/2006/relationships" xmlns:p="http://schemas.openxmlformats.org/presentationml/2006/main">
+  <p:cSld>
+    <p:spTree>
+      <p:nvGrpSpPr>
+        <p:cNvPr id="1" name=""/>
+        <p:cNvGrpSpPr/>
+        <p:nvPr/>
+      </p:nvGrpSpPr>
+      <p:grpSpPr>
+        <a:xfrm>
+          <a:off x="0" y="0"/>
+          <a:ext cx="0" cy="0"/>
+          <a:chOff x="0" y="0"/>
+          <a:chExt cx="0" cy="0"/>
+        </a:xfrm>
+      </p:grpSpPr>
+      <p:sp>
+        <p:nvSpPr>
+          <p:cNvPr id="2" name="Title 1">
+            <a:extLst>
+              <a:ext uri="{FF2B5EF4-FFF2-40B4-BE49-F238E27FC236}">
+                <a16:creationId xmlns:a16="http://schemas.microsoft.com/office/drawing/2014/main" id="{E0A21536-73B6-41A6-8E76-92160A5F5B30}"/>
+              </a:ext>
+            </a:extLst>
+          </p:cNvPr>
+          <p:cNvSpPr>
+            <a:spLocks noGrp="1"/>
+          </p:cNvSpPr>
+          <p:nvPr>
+            <p:ph type="title"/>
+          </p:nvPr>
+        </p:nvSpPr>
+        <p:spPr/>
+        <p:txBody>
+          <a:bodyPr/>
+          <a:lstStyle/>
+          <a:p>
+            <a:r>
+              <a:rPr lang="en-US" dirty="0"/>
+              <a:t>Data Preprocessing (contd.)</a:t>
+            </a:r>
+            <a:endParaRPr lang="en-IN" dirty="0"/>
+          </a:p>
+        </p:txBody>
+      </p:sp>
+      <p:sp>
+        <p:nvSpPr>
+          <p:cNvPr id="3" name="Content Placeholder 2">
+            <a:extLst>
+              <a:ext uri="{FF2B5EF4-FFF2-40B4-BE49-F238E27FC236}">
+                <a16:creationId xmlns:a16="http://schemas.microsoft.com/office/drawing/2014/main" id="{A24CE5B2-822D-4C1A-83F1-C8C4361CF3CB}"/>
+              </a:ext>
+            </a:extLst>
+          </p:cNvPr>
+          <p:cNvSpPr>
+            <a:spLocks noGrp="1"/>
+          </p:cNvSpPr>
+          <p:nvPr>
+            <p:ph idx="1"/>
+          </p:nvPr>
+        </p:nvSpPr>
+        <p:spPr>
+          <a:xfrm>
+            <a:off x="720312" y="1687728"/>
+            <a:ext cx="8640000" cy="4384800"/>
+          </a:xfrm>
+        </p:spPr>
+        <p:txBody>
+          <a:bodyPr/>
+          <a:lstStyle/>
+          <a:p>
+            <a:pPr marL="457200" indent="-457200">
+              <a:buFont typeface="Arial" panose="020B0604020202020204" pitchFamily="34" charset="0"/>
+              <a:buChar char="•"/>
+            </a:pPr>
+            <a:r>
+              <a:rPr lang="en-US" dirty="0"/>
+              <a:t>Upon calculation of all the necessary features, we will then need to assimilate everything into a single dataset.</a:t>
+            </a:r>
+          </a:p>
+          <a:p>
+            <a:pPr marL="457200" indent="-457200">
+              <a:buFont typeface="Arial" panose="020B0604020202020204" pitchFamily="34" charset="0"/>
+              <a:buChar char="•"/>
+            </a:pPr>
+            <a:r>
+              <a:rPr lang="en-US" dirty="0"/>
+              <a:t>Thus, I took all the [ticker symbols, date, open, close] features into a separate </a:t>
+            </a:r>
+            <a:r>
+              <a:rPr lang="en-US" dirty="0" err="1"/>
+              <a:t>dataframe</a:t>
+            </a:r>
+            <a:r>
+              <a:rPr lang="en-US" dirty="0"/>
+              <a:t> and appended it with the features extracted from sentiment analysis.</a:t>
+            </a:r>
+          </a:p>
+          <a:p>
+            <a:pPr marL="457200" indent="-457200">
+              <a:buFont typeface="Arial" panose="020B0604020202020204" pitchFamily="34" charset="0"/>
+              <a:buChar char="•"/>
+            </a:pPr>
+            <a:r>
+              <a:rPr lang="en-US" dirty="0"/>
+              <a:t>To preserve the order of date, we took a </a:t>
+            </a:r>
+            <a:r>
+              <a:rPr lang="en-US" dirty="0" err="1"/>
+              <a:t>datetime.timetuple</a:t>
+            </a:r>
+            <a:r>
+              <a:rPr lang="en-US" dirty="0"/>
+              <a:t>() and extracted the day number of the year using the </a:t>
+            </a:r>
+            <a:r>
+              <a:rPr lang="en-US" dirty="0" err="1"/>
+              <a:t>tm_yday</a:t>
+            </a:r>
+            <a:r>
+              <a:rPr lang="en-US" dirty="0"/>
+              <a:t> parameter. </a:t>
+            </a:r>
+          </a:p>
+          <a:p>
+            <a:pPr marL="457200" indent="-457200">
+              <a:buFont typeface="Arial" panose="020B0604020202020204" pitchFamily="34" charset="0"/>
+              <a:buChar char="•"/>
+            </a:pPr>
+            <a:r>
+              <a:rPr lang="en-US" dirty="0"/>
+              <a:t>Therefore, the final processed dataset before training is of the shape (21286,6)</a:t>
+            </a:r>
+            <a:endParaRPr lang="en-IN" dirty="0"/>
+          </a:p>
+        </p:txBody>
+      </p:sp>
+    </p:spTree>
+    <p:extLst>
+      <p:ext uri="{BB962C8B-B14F-4D97-AF65-F5344CB8AC3E}">
+        <p14:creationId xmlns:p14="http://schemas.microsoft.com/office/powerpoint/2010/main" val="4135502000"/>
+      </p:ext>
+    </p:extLst>
+  </p:cSld>
+  <p:clrMapOvr>
+    <a:masterClrMapping/>
+  </p:clrMapOvr>
+</p:sld>
+</file>
+
+<file path=ppt/slides/slide17.xml><?xml version="1.0" encoding="utf-8"?>
+<p:sld xmlns:a="http://schemas.openxmlformats.org/drawingml/2006/main" xmlns:r="http://schemas.openxmlformats.org/officeDocument/2006/relationships" xmlns:p="http://schemas.openxmlformats.org/presentationml/2006/main">
+  <p:cSld>
+    <p:spTree>
+      <p:nvGrpSpPr>
+        <p:cNvPr id="1" name=""/>
+        <p:cNvGrpSpPr/>
+        <p:nvPr/>
+      </p:nvGrpSpPr>
+      <p:grpSpPr>
+        <a:xfrm>
+          <a:off x="0" y="0"/>
+          <a:ext cx="0" cy="0"/>
+          <a:chOff x="0" y="0"/>
+          <a:chExt cx="0" cy="0"/>
+        </a:xfrm>
+      </p:grpSpPr>
+      <p:sp>
+        <p:nvSpPr>
+          <p:cNvPr id="2" name="Title 1">
+            <a:extLst>
+              <a:ext uri="{FF2B5EF4-FFF2-40B4-BE49-F238E27FC236}">
+                <a16:creationId xmlns:a16="http://schemas.microsoft.com/office/drawing/2014/main" id="{3424C4CC-D47E-42A8-8659-E4D65EB8837E}"/>
+              </a:ext>
+            </a:extLst>
+          </p:cNvPr>
+          <p:cNvSpPr>
+            <a:spLocks noGrp="1"/>
+          </p:cNvSpPr>
+          <p:nvPr>
+            <p:ph type="title"/>
+          </p:nvPr>
+        </p:nvSpPr>
+        <p:spPr/>
+        <p:txBody>
+          <a:bodyPr/>
+          <a:lstStyle/>
+          <a:p>
+            <a:r>
+              <a:rPr lang="en-US" dirty="0"/>
+              <a:t>Machine Learning Models</a:t>
+            </a:r>
+            <a:endParaRPr lang="en-IN" dirty="0"/>
+          </a:p>
+        </p:txBody>
+      </p:sp>
+      <p:sp>
+        <p:nvSpPr>
+          <p:cNvPr id="3" name="Content Placeholder 2">
+            <a:extLst>
+              <a:ext uri="{FF2B5EF4-FFF2-40B4-BE49-F238E27FC236}">
+                <a16:creationId xmlns:a16="http://schemas.microsoft.com/office/drawing/2014/main" id="{5E4F102B-311E-47AF-8DBB-A6F72F6A2C84}"/>
+              </a:ext>
+            </a:extLst>
+          </p:cNvPr>
+          <p:cNvSpPr>
+            <a:spLocks noGrp="1"/>
+          </p:cNvSpPr>
+          <p:nvPr>
+            <p:ph idx="1"/>
+          </p:nvPr>
+        </p:nvSpPr>
+        <p:spPr/>
+        <p:txBody>
+          <a:bodyPr/>
+          <a:lstStyle/>
+          <a:p>
+            <a:pPr marL="457200" indent="-457200">
+              <a:buFont typeface="Arial" panose="020B0604020202020204" pitchFamily="34" charset="0"/>
+              <a:buChar char="•"/>
+            </a:pPr>
+            <a:r>
+              <a:rPr lang="en-US" dirty="0"/>
+              <a:t>Baseline testing – Though our aim is to set this project on a deep learning model, we created some machine learning regression models to get a baseline measurements. </a:t>
+            </a:r>
+          </a:p>
+          <a:p>
+            <a:pPr marL="457200" indent="-457200">
+              <a:buFont typeface="Arial" panose="020B0604020202020204" pitchFamily="34" charset="0"/>
+              <a:buChar char="•"/>
+            </a:pPr>
+            <a:r>
+              <a:rPr lang="en-US" dirty="0"/>
+              <a:t>This will help us to fine tune our DNN to achieve realistic and great RMSE (metric used here) values.</a:t>
+            </a:r>
+          </a:p>
+          <a:p>
+            <a:pPr marL="457200" indent="-457200">
+              <a:buFont typeface="Arial" panose="020B0604020202020204" pitchFamily="34" charset="0"/>
+              <a:buChar char="•"/>
+            </a:pPr>
+            <a:r>
+              <a:rPr lang="en-US" dirty="0"/>
+              <a:t>As DNN work on a somewhat different principle, we will be focusing on loss and cost function minimization.   </a:t>
+            </a:r>
+            <a:endParaRPr lang="en-IN" dirty="0"/>
+          </a:p>
+        </p:txBody>
+      </p:sp>
+    </p:spTree>
+    <p:extLst>
+      <p:ext uri="{BB962C8B-B14F-4D97-AF65-F5344CB8AC3E}">
+        <p14:creationId xmlns:p14="http://schemas.microsoft.com/office/powerpoint/2010/main" val="1860498974"/>
+      </p:ext>
+    </p:extLst>
+  </p:cSld>
+  <p:clrMapOvr>
+    <a:masterClrMapping/>
+  </p:clrMapOvr>
+</p:sld>
+</file>
+
+<file path=ppt/slides/slide18.xml><?xml version="1.0" encoding="utf-8"?>
+<p:sld xmlns:a="http://schemas.openxmlformats.org/drawingml/2006/main" xmlns:r="http://schemas.openxmlformats.org/officeDocument/2006/relationships" xmlns:p="http://schemas.openxmlformats.org/presentationml/2006/main">
+  <p:cSld>
+    <p:spTree>
+      <p:nvGrpSpPr>
+        <p:cNvPr id="1" name=""/>
+        <p:cNvGrpSpPr/>
+        <p:nvPr/>
+      </p:nvGrpSpPr>
+      <p:grpSpPr>
+        <a:xfrm>
+          <a:off x="0" y="0"/>
+          <a:ext cx="0" cy="0"/>
+          <a:chOff x="0" y="0"/>
+          <a:chExt cx="0" cy="0"/>
+        </a:xfrm>
+      </p:grpSpPr>
+      <p:sp>
+        <p:nvSpPr>
+          <p:cNvPr id="2" name="Title 1">
+            <a:extLst>
+              <a:ext uri="{FF2B5EF4-FFF2-40B4-BE49-F238E27FC236}">
+                <a16:creationId xmlns:a16="http://schemas.microsoft.com/office/drawing/2014/main" id="{1E91B22B-A568-48D6-998A-E3BBAA05A6B6}"/>
+              </a:ext>
+            </a:extLst>
+          </p:cNvPr>
+          <p:cNvSpPr>
+            <a:spLocks noGrp="1"/>
+          </p:cNvSpPr>
+          <p:nvPr>
+            <p:ph type="title"/>
+          </p:nvPr>
+        </p:nvSpPr>
+        <p:spPr/>
+        <p:txBody>
+          <a:bodyPr/>
+          <a:lstStyle/>
+          <a:p>
+            <a:r>
+              <a:rPr lang="en-US" dirty="0"/>
+              <a:t>Machine Learning Models (contd.)</a:t>
+            </a:r>
+            <a:endParaRPr lang="en-IN" dirty="0"/>
+          </a:p>
+        </p:txBody>
+      </p:sp>
+      <p:sp>
+        <p:nvSpPr>
+          <p:cNvPr id="3" name="Content Placeholder 2">
+            <a:extLst>
+              <a:ext uri="{FF2B5EF4-FFF2-40B4-BE49-F238E27FC236}">
+                <a16:creationId xmlns:a16="http://schemas.microsoft.com/office/drawing/2014/main" id="{4C233E80-DAB1-47B9-A4D8-4FA3E8BBC6CA}"/>
+              </a:ext>
+            </a:extLst>
+          </p:cNvPr>
+          <p:cNvSpPr>
+            <a:spLocks noGrp="1"/>
+          </p:cNvSpPr>
+          <p:nvPr>
+            <p:ph idx="1"/>
+          </p:nvPr>
+        </p:nvSpPr>
+        <p:spPr>
+          <a:xfrm>
+            <a:off x="720000" y="1818549"/>
+            <a:ext cx="8640000" cy="4384800"/>
+          </a:xfrm>
+        </p:spPr>
+        <p:txBody>
+          <a:bodyPr/>
+          <a:lstStyle/>
+          <a:p>
+            <a:pPr marL="457200" indent="-457200">
+              <a:buFont typeface="Arial" panose="020B0604020202020204" pitchFamily="34" charset="0"/>
+              <a:buChar char="•"/>
+            </a:pPr>
+            <a:r>
+              <a:rPr lang="en-US" dirty="0"/>
+              <a:t>For the purpose of setting a benchmark, 4 regression models were used. </a:t>
+            </a:r>
+          </a:p>
+          <a:p>
+            <a:pPr marL="457200" indent="-457200">
+              <a:buFont typeface="Arial" panose="020B0604020202020204" pitchFamily="34" charset="0"/>
+              <a:buChar char="•"/>
+            </a:pPr>
+            <a:r>
+              <a:rPr lang="en-US" dirty="0"/>
+              <a:t>They are : Linear Regression, Support Vector Regression, Random Forest Regression and Gradient Boost Regression.</a:t>
+            </a:r>
+          </a:p>
+          <a:p>
+            <a:pPr marL="457200" indent="-457200">
+              <a:buFont typeface="Arial" panose="020B0604020202020204" pitchFamily="34" charset="0"/>
+              <a:buChar char="•"/>
+            </a:pPr>
+            <a:r>
+              <a:rPr lang="en-US" dirty="0"/>
+              <a:t>Here are the results of a single run, with train test split in the ratio 70 : 30. The models were tested on 2 types of pre processed datasets, one that was simply label encoded and the other that was one hot encoded to take into account the stock tickers as well.</a:t>
+            </a:r>
+          </a:p>
+          <a:p>
+            <a:endParaRPr lang="en-IN" dirty="0"/>
+          </a:p>
+        </p:txBody>
+      </p:sp>
+    </p:spTree>
+    <p:extLst>
+      <p:ext uri="{BB962C8B-B14F-4D97-AF65-F5344CB8AC3E}">
+        <p14:creationId xmlns:p14="http://schemas.microsoft.com/office/powerpoint/2010/main" val="1447263693"/>
+      </p:ext>
+    </p:extLst>
+  </p:cSld>
+  <p:clrMapOvr>
+    <a:masterClrMapping/>
+  </p:clrMapOvr>
+</p:sld>
+</file>
+
+<file path=ppt/slides/slide19.xml><?xml version="1.0" encoding="utf-8"?>
+<p:sld xmlns:a="http://schemas.openxmlformats.org/drawingml/2006/main" xmlns:r="http://schemas.openxmlformats.org/officeDocument/2006/relationships" xmlns:p="http://schemas.openxmlformats.org/presentationml/2006/main">
+  <p:cSld>
+    <p:spTree>
+      <p:nvGrpSpPr>
+        <p:cNvPr id="1" name=""/>
+        <p:cNvGrpSpPr/>
+        <p:nvPr/>
+      </p:nvGrpSpPr>
+      <p:grpSpPr>
+        <a:xfrm>
+          <a:off x="0" y="0"/>
+          <a:ext cx="0" cy="0"/>
+          <a:chOff x="0" y="0"/>
+          <a:chExt cx="0" cy="0"/>
+        </a:xfrm>
+      </p:grpSpPr>
+      <p:sp>
+        <p:nvSpPr>
+          <p:cNvPr id="2" name="Title 1">
+            <a:extLst>
+              <a:ext uri="{FF2B5EF4-FFF2-40B4-BE49-F238E27FC236}">
+                <a16:creationId xmlns:a16="http://schemas.microsoft.com/office/drawing/2014/main" id="{D18D59E2-0D62-49F7-BC16-3116F31E4A63}"/>
+              </a:ext>
+            </a:extLst>
+          </p:cNvPr>
+          <p:cNvSpPr>
+            <a:spLocks noGrp="1"/>
+          </p:cNvSpPr>
+          <p:nvPr>
+            <p:ph type="title"/>
+          </p:nvPr>
+        </p:nvSpPr>
+        <p:spPr/>
+        <p:txBody>
+          <a:bodyPr/>
+          <a:lstStyle/>
+          <a:p>
+            <a:r>
+              <a:rPr lang="en-US" dirty="0"/>
+              <a:t>Performance Analysis</a:t>
+            </a:r>
+            <a:endParaRPr lang="en-IN" dirty="0"/>
+          </a:p>
+        </p:txBody>
+      </p:sp>
+      <p:graphicFrame>
+        <p:nvGraphicFramePr>
+          <p:cNvPr id="4" name="Content Placeholder 3">
+            <a:extLst>
+              <a:ext uri="{FF2B5EF4-FFF2-40B4-BE49-F238E27FC236}">
+                <a16:creationId xmlns:a16="http://schemas.microsoft.com/office/drawing/2014/main" id="{C59030CB-6293-45B6-BA5C-BCF31665DA51}"/>
+              </a:ext>
+            </a:extLst>
+          </p:cNvPr>
+          <p:cNvGraphicFramePr>
+            <a:graphicFrameLocks noGrp="1"/>
+          </p:cNvGraphicFramePr>
+          <p:nvPr>
+            <p:ph idx="1"/>
+            <p:extLst>
+              <p:ext uri="{D42A27DB-BD31-4B8C-83A1-F6EECF244321}">
+                <p14:modId xmlns:p14="http://schemas.microsoft.com/office/powerpoint/2010/main" val="4088934463"/>
+              </p:ext>
+            </p:extLst>
+          </p:nvPr>
+        </p:nvGraphicFramePr>
+        <p:xfrm>
+          <a:off x="721450" y="1386865"/>
+          <a:ext cx="8639175" cy="4384675"/>
+        </p:xfrm>
+        <a:graphic>
+          <a:graphicData uri="http://schemas.openxmlformats.org/drawingml/2006/chart">
+            <c:chart xmlns:c="http://schemas.openxmlformats.org/drawingml/2006/chart" xmlns:r="http://schemas.openxmlformats.org/officeDocument/2006/relationships" r:id="rId2"/>
+          </a:graphicData>
+        </a:graphic>
+      </p:graphicFrame>
+      <p:sp>
+        <p:nvSpPr>
+          <p:cNvPr id="5" name="TextBox 4">
+            <a:extLst>
+              <a:ext uri="{FF2B5EF4-FFF2-40B4-BE49-F238E27FC236}">
+                <a16:creationId xmlns:a16="http://schemas.microsoft.com/office/drawing/2014/main" id="{599B7819-220C-4320-80BE-F71F996D2A7C}"/>
+              </a:ext>
+            </a:extLst>
+          </p:cNvPr>
+          <p:cNvSpPr txBox="1"/>
+          <p:nvPr/>
+        </p:nvSpPr>
+        <p:spPr>
+          <a:xfrm>
+            <a:off x="720000" y="5988818"/>
+            <a:ext cx="7710567" cy="646331"/>
+          </a:xfrm>
+          <a:prstGeom prst="rect">
+            <a:avLst/>
+          </a:prstGeom>
+          <a:noFill/>
+        </p:spPr>
+        <p:txBody>
+          <a:bodyPr wrap="square" rtlCol="0">
+            <a:spAutoFit/>
+          </a:bodyPr>
+          <a:lstStyle/>
+          <a:p>
+            <a:r>
+              <a:rPr lang="en-US" dirty="0"/>
+              <a:t>As we can see, there is a trend that says one hot encoded data usually gives better accuracy. </a:t>
+            </a:r>
+            <a:endParaRPr lang="en-IN" dirty="0"/>
+          </a:p>
+        </p:txBody>
+      </p:sp>
+    </p:spTree>
+    <p:extLst>
+      <p:ext uri="{BB962C8B-B14F-4D97-AF65-F5344CB8AC3E}">
+        <p14:creationId xmlns:p14="http://schemas.microsoft.com/office/powerpoint/2010/main" val="823602004"/>
+      </p:ext>
+    </p:extLst>
+  </p:cSld>
+  <p:clrMapOvr>
+    <a:masterClrMapping/>
+  </p:clrMapOvr>
+</p:sld>
+</file>
+
+<file path=ppt/slides/slide2.xml><?xml version="1.0" encoding="utf-8"?>
+<p:sld xmlns:a="http://schemas.openxmlformats.org/drawingml/2006/main" xmlns:r="http://schemas.openxmlformats.org/officeDocument/2006/relationships" xmlns:p="http://schemas.openxmlformats.org/presentationml/2006/main">
+  <p:cSld>
+    <p:spTree>
+      <p:nvGrpSpPr>
+        <p:cNvPr id="1" name=""/>
+        <p:cNvGrpSpPr/>
+        <p:nvPr/>
+      </p:nvGrpSpPr>
+      <p:grpSpPr>
+        <a:xfrm>
+          <a:off x="0" y="0"/>
+          <a:ext cx="0" cy="0"/>
+          <a:chOff x="0" y="0"/>
+          <a:chExt cx="0" cy="0"/>
+        </a:xfrm>
+      </p:grpSpPr>
+      <p:sp>
+        <p:nvSpPr>
+          <p:cNvPr id="2" name="Title 1">
+            <a:extLst>
+              <a:ext uri="{FF2B5EF4-FFF2-40B4-BE49-F238E27FC236}">
+                <a16:creationId xmlns:a16="http://schemas.microsoft.com/office/drawing/2014/main" id="{305DE78D-F562-4328-93E3-A4A75180F39B}"/>
+              </a:ext>
+            </a:extLst>
+          </p:cNvPr>
+          <p:cNvSpPr txBox="1">
+            <a:spLocks noGrp="1"/>
+          </p:cNvSpPr>
+          <p:nvPr>
+            <p:ph type="title" idx="4294967295"/>
+          </p:nvPr>
+        </p:nvSpPr>
+        <p:spPr>
+          <a:xfrm>
+            <a:off x="792000" y="104751"/>
+            <a:ext cx="8568000" cy="1440000"/>
+          </a:xfrm>
+        </p:spPr>
+        <p:txBody>
+          <a:bodyPr>
+            <a:spAutoFit/>
+          </a:bodyPr>
+          <a:lstStyle/>
+          <a:p>
+            <a:pPr lvl="0"/>
+            <a:r>
+              <a:rPr lang="en-IN" dirty="0"/>
+              <a:t>Problem Statement</a:t>
+            </a:r>
+          </a:p>
+        </p:txBody>
+      </p:sp>
+      <p:sp>
+        <p:nvSpPr>
+          <p:cNvPr id="3" name="Text Placeholder 2">
+            <a:extLst>
+              <a:ext uri="{FF2B5EF4-FFF2-40B4-BE49-F238E27FC236}">
+                <a16:creationId xmlns:a16="http://schemas.microsoft.com/office/drawing/2014/main" id="{6A617980-BCEE-409D-AF6E-97FCF61D30EF}"/>
+              </a:ext>
+            </a:extLst>
+          </p:cNvPr>
+          <p:cNvSpPr txBox="1">
+            <a:spLocks noGrp="1"/>
+          </p:cNvSpPr>
+          <p:nvPr>
+            <p:ph type="body" idx="4294967295"/>
+          </p:nvPr>
+        </p:nvSpPr>
+        <p:spPr>
+          <a:xfrm>
+            <a:off x="792000" y="1874601"/>
+            <a:ext cx="8568000" cy="1803096"/>
+          </a:xfrm>
+        </p:spPr>
+        <p:txBody>
+          <a:bodyPr>
+            <a:normAutofit lnSpcReduction="10000"/>
+          </a:bodyPr>
+          <a:lstStyle/>
+          <a:p>
+            <a:pPr marL="342900" lvl="0" indent="-342900">
+              <a:buClr>
+                <a:srgbClr val="EF2929"/>
+              </a:buClr>
+              <a:buSzPct val="45000"/>
+              <a:buFont typeface="Wingdings" panose="05000000000000000000" pitchFamily="2" charset="2"/>
+              <a:buChar char="Ø"/>
+            </a:pPr>
+            <a:r>
+              <a:rPr lang="en-US" sz="2200" dirty="0">
+                <a:latin typeface="Times new roman" pitchFamily="18"/>
+                <a:cs typeface="Times New Roman" pitchFamily="18"/>
+              </a:rPr>
+              <a:t>To solve real world scenario of predicting stock market using new articles from the Internet.</a:t>
+            </a:r>
+          </a:p>
+          <a:p>
+            <a:pPr marL="342900" lvl="0" indent="-342900">
+              <a:buClr>
+                <a:srgbClr val="EF2929"/>
+              </a:buClr>
+              <a:buSzPct val="45000"/>
+              <a:buFont typeface="Wingdings" panose="05000000000000000000" pitchFamily="2" charset="2"/>
+              <a:buChar char="Ø"/>
+            </a:pPr>
+            <a:r>
+              <a:rPr lang="en-US" sz="2200" dirty="0">
+                <a:latin typeface="Times new roman" pitchFamily="18"/>
+                <a:cs typeface="Times New Roman" pitchFamily="18"/>
+              </a:rPr>
+              <a:t>We do not always have a good dataset to know about the details of the stock market, and here predicting using news articles can be a very effective way to gain fast and effective insights.</a:t>
+            </a:r>
+          </a:p>
+        </p:txBody>
+      </p:sp>
+    </p:spTree>
+  </p:cSld>
+  <p:clrMapOvr>
+    <a:masterClrMapping/>
+  </p:clrMapOvr>
+</p:sld>
+</file>
+
+<file path=ppt/slides/slide20.xml><?xml version="1.0" encoding="utf-8"?>
+<p:sld xmlns:a="http://schemas.openxmlformats.org/drawingml/2006/main" xmlns:r="http://schemas.openxmlformats.org/officeDocument/2006/relationships" xmlns:p="http://schemas.openxmlformats.org/presentationml/2006/main">
+  <p:cSld>
+    <p:spTree>
+      <p:nvGrpSpPr>
+        <p:cNvPr id="1" name=""/>
+        <p:cNvGrpSpPr/>
+        <p:nvPr/>
+      </p:nvGrpSpPr>
+      <p:grpSpPr>
+        <a:xfrm>
+          <a:off x="0" y="0"/>
+          <a:ext cx="0" cy="0"/>
+          <a:chOff x="0" y="0"/>
+          <a:chExt cx="0" cy="0"/>
+        </a:xfrm>
+      </p:grpSpPr>
+      <p:sp>
+        <p:nvSpPr>
+          <p:cNvPr id="2" name="Title 1">
+            <a:extLst>
+              <a:ext uri="{FF2B5EF4-FFF2-40B4-BE49-F238E27FC236}">
+                <a16:creationId xmlns:a16="http://schemas.microsoft.com/office/drawing/2014/main" id="{C5F0C98C-D3E5-496D-AA49-B4371F69EAF3}"/>
+              </a:ext>
+            </a:extLst>
+          </p:cNvPr>
+          <p:cNvSpPr>
+            <a:spLocks noGrp="1"/>
+          </p:cNvSpPr>
+          <p:nvPr>
+            <p:ph type="title"/>
+          </p:nvPr>
+        </p:nvSpPr>
+        <p:spPr/>
+        <p:txBody>
+          <a:bodyPr/>
+          <a:lstStyle/>
+          <a:p>
+            <a:r>
+              <a:rPr lang="en-US" dirty="0"/>
+              <a:t>Other work done</a:t>
+            </a:r>
+            <a:endParaRPr lang="en-IN" dirty="0"/>
+          </a:p>
+        </p:txBody>
+      </p:sp>
+      <p:sp>
+        <p:nvSpPr>
+          <p:cNvPr id="3" name="Content Placeholder 2">
+            <a:extLst>
+              <a:ext uri="{FF2B5EF4-FFF2-40B4-BE49-F238E27FC236}">
+                <a16:creationId xmlns:a16="http://schemas.microsoft.com/office/drawing/2014/main" id="{FA4B93AD-53EB-4DC8-B65A-8F283279EF75}"/>
+              </a:ext>
+            </a:extLst>
+          </p:cNvPr>
+          <p:cNvSpPr>
+            <a:spLocks noGrp="1"/>
+          </p:cNvSpPr>
+          <p:nvPr>
+            <p:ph idx="1"/>
+          </p:nvPr>
+        </p:nvSpPr>
+        <p:spPr>
+          <a:xfrm>
+            <a:off x="720000" y="1948985"/>
+            <a:ext cx="8640000" cy="4384800"/>
+          </a:xfrm>
+        </p:spPr>
+        <p:txBody>
+          <a:bodyPr/>
+          <a:lstStyle/>
+          <a:p>
+            <a:pPr marL="457200" indent="-457200">
+              <a:buFont typeface="Arial" panose="020B0604020202020204" pitchFamily="34" charset="0"/>
+              <a:buChar char="•"/>
+            </a:pPr>
+            <a:r>
+              <a:rPr lang="en-US" dirty="0"/>
+              <a:t>Worked on the draft of the research paper, to be submitted in a respectable SCOPUS rated journal.</a:t>
+            </a:r>
+          </a:p>
+          <a:p>
+            <a:pPr marL="457200" indent="-457200">
+              <a:buFont typeface="Arial" panose="020B0604020202020204" pitchFamily="34" charset="0"/>
+              <a:buChar char="•"/>
+            </a:pPr>
+            <a:r>
+              <a:rPr lang="en-US" dirty="0"/>
+              <a:t>Started developing the neural network code, needs fault testing.</a:t>
+            </a:r>
+          </a:p>
+          <a:p>
+            <a:pPr marL="457200" indent="-457200">
+              <a:buFont typeface="Arial" panose="020B0604020202020204" pitchFamily="34" charset="0"/>
+              <a:buChar char="•"/>
+            </a:pPr>
+            <a:r>
+              <a:rPr lang="en-US" dirty="0"/>
+              <a:t>Extensive comparison and experimentation for paper.</a:t>
+            </a:r>
+          </a:p>
+          <a:p>
+            <a:pPr marL="457200" indent="-457200">
+              <a:buFont typeface="Arial" panose="020B0604020202020204" pitchFamily="34" charset="0"/>
+              <a:buChar char="•"/>
+            </a:pPr>
+            <a:r>
+              <a:rPr lang="en-US" dirty="0"/>
+              <a:t>Completing rough draft of the project thesis.</a:t>
+            </a:r>
+          </a:p>
+          <a:p>
+            <a:pPr marL="457200" indent="-457200">
+              <a:buFont typeface="Arial" panose="020B0604020202020204" pitchFamily="34" charset="0"/>
+              <a:buChar char="•"/>
+            </a:pPr>
+            <a:endParaRPr lang="en-IN" dirty="0"/>
+          </a:p>
+        </p:txBody>
+      </p:sp>
+    </p:spTree>
+    <p:extLst>
+      <p:ext uri="{BB962C8B-B14F-4D97-AF65-F5344CB8AC3E}">
+        <p14:creationId xmlns:p14="http://schemas.microsoft.com/office/powerpoint/2010/main" val="557982325"/>
+      </p:ext>
+    </p:extLst>
+  </p:cSld>
+  <p:clrMapOvr>
+    <a:masterClrMapping/>
+  </p:clrMapOvr>
+</p:sld>
+</file>
+
+<file path=ppt/slides/slide21.xml><?xml version="1.0" encoding="utf-8"?>
+<p:sld xmlns:a="http://schemas.openxmlformats.org/drawingml/2006/main" xmlns:r="http://schemas.openxmlformats.org/officeDocument/2006/relationships" xmlns:p="http://schemas.openxmlformats.org/presentationml/2006/main">
+  <p:cSld>
+    <p:spTree>
+      <p:nvGrpSpPr>
+        <p:cNvPr id="1" name=""/>
+        <p:cNvGrpSpPr/>
+        <p:nvPr/>
+      </p:nvGrpSpPr>
+      <p:grpSpPr>
+        <a:xfrm>
+          <a:off x="0" y="0"/>
+          <a:ext cx="0" cy="0"/>
+          <a:chOff x="0" y="0"/>
+          <a:chExt cx="0" cy="0"/>
+        </a:xfrm>
+      </p:grpSpPr>
+      <p:sp>
+        <p:nvSpPr>
+          <p:cNvPr id="2" name="Title 1">
+            <a:extLst>
+              <a:ext uri="{FF2B5EF4-FFF2-40B4-BE49-F238E27FC236}">
                 <a16:creationId xmlns:a16="http://schemas.microsoft.com/office/drawing/2014/main" id="{FFB85D73-4112-4B49-9D8D-11647525ED62}"/>
               </a:ext>
             </a:extLst>
@@ -10113,7 +11857,620 @@
 </p:sld>
 </file>
 
-<file path=ppt/slides/slide2.xml><?xml version="1.0" encoding="utf-8"?>
+<file path=ppt/slides/slide3.xml><?xml version="1.0" encoding="utf-8"?>
+<p:sld xmlns:a="http://schemas.openxmlformats.org/drawingml/2006/main" xmlns:r="http://schemas.openxmlformats.org/officeDocument/2006/relationships" xmlns:p="http://schemas.openxmlformats.org/presentationml/2006/main">
+  <p:cSld>
+    <p:spTree>
+      <p:nvGrpSpPr>
+        <p:cNvPr id="1" name=""/>
+        <p:cNvGrpSpPr/>
+        <p:nvPr/>
+      </p:nvGrpSpPr>
+      <p:grpSpPr>
+        <a:xfrm>
+          <a:off x="0" y="0"/>
+          <a:ext cx="0" cy="0"/>
+          <a:chOff x="0" y="0"/>
+          <a:chExt cx="0" cy="0"/>
+        </a:xfrm>
+      </p:grpSpPr>
+      <p:sp>
+        <p:nvSpPr>
+          <p:cNvPr id="2" name="Title 1">
+            <a:extLst>
+              <a:ext uri="{FF2B5EF4-FFF2-40B4-BE49-F238E27FC236}">
+                <a16:creationId xmlns:a16="http://schemas.microsoft.com/office/drawing/2014/main" id="{3DEE3CD8-294B-46E1-8FC8-5ABCA153B931}"/>
+              </a:ext>
+            </a:extLst>
+          </p:cNvPr>
+          <p:cNvSpPr txBox="1">
+            <a:spLocks noGrp="1"/>
+          </p:cNvSpPr>
+          <p:nvPr>
+            <p:ph type="title" idx="4294967295"/>
+          </p:nvPr>
+        </p:nvSpPr>
+        <p:spPr>
+          <a:xfrm>
+            <a:off x="792000" y="195183"/>
+            <a:ext cx="8568000" cy="1440000"/>
+          </a:xfrm>
+        </p:spPr>
+        <p:txBody>
+          <a:bodyPr>
+            <a:spAutoFit/>
+          </a:bodyPr>
+          <a:lstStyle/>
+          <a:p>
+            <a:pPr lvl="0"/>
+            <a:r>
+              <a:rPr lang="en-IN" dirty="0"/>
+              <a:t>Project Objectives</a:t>
+            </a:r>
+          </a:p>
+        </p:txBody>
+      </p:sp>
+      <p:sp>
+        <p:nvSpPr>
+          <p:cNvPr id="3" name="Text Placeholder 2">
+            <a:extLst>
+              <a:ext uri="{FF2B5EF4-FFF2-40B4-BE49-F238E27FC236}">
+                <a16:creationId xmlns:a16="http://schemas.microsoft.com/office/drawing/2014/main" id="{EAF19557-16A5-4182-AACC-6E9F649EC460}"/>
+              </a:ext>
+            </a:extLst>
+          </p:cNvPr>
+          <p:cNvSpPr txBox="1">
+            <a:spLocks noGrp="1"/>
+          </p:cNvSpPr>
+          <p:nvPr>
+            <p:ph type="body" idx="4294967295"/>
+          </p:nvPr>
+        </p:nvSpPr>
+        <p:spPr>
+          <a:xfrm>
+            <a:off x="792000" y="1939016"/>
+            <a:ext cx="8640000" cy="4384800"/>
+          </a:xfrm>
+        </p:spPr>
+        <p:txBody>
+          <a:bodyPr/>
+          <a:lstStyle/>
+          <a:p>
+            <a:pPr marL="342900" lvl="0" indent="-342900" algn="just">
+              <a:buClr>
+                <a:srgbClr val="EF2929"/>
+              </a:buClr>
+              <a:buSzPct val="45000"/>
+              <a:buFont typeface="Wingdings" panose="05000000000000000000" pitchFamily="2" charset="2"/>
+              <a:buChar char="Ø"/>
+            </a:pPr>
+            <a:r>
+              <a:rPr lang="en-IN" sz="2200" dirty="0">
+                <a:latin typeface="Times New Roman" pitchFamily="18"/>
+              </a:rPr>
+              <a:t>Scrape textual news  data and historical numerical stock data for a period of time from the internet using frameworks like </a:t>
+            </a:r>
+            <a:r>
+              <a:rPr lang="en-IN" sz="2200" dirty="0" err="1">
+                <a:latin typeface="Times New Roman" pitchFamily="18"/>
+              </a:rPr>
+              <a:t>BeautifulSoup</a:t>
+            </a:r>
+            <a:r>
+              <a:rPr lang="en-IN" sz="2200" dirty="0">
+                <a:latin typeface="Times New Roman" pitchFamily="18"/>
+              </a:rPr>
+              <a:t>, Selenium etc.</a:t>
+            </a:r>
+          </a:p>
+          <a:p>
+            <a:pPr marL="342900" lvl="0" indent="-342900" algn="just">
+              <a:buClr>
+                <a:srgbClr val="EF2929"/>
+              </a:buClr>
+              <a:buSzPct val="45000"/>
+              <a:buFont typeface="Wingdings" panose="05000000000000000000" pitchFamily="2" charset="2"/>
+              <a:buChar char="Ø"/>
+            </a:pPr>
+            <a:r>
+              <a:rPr lang="en-IN" sz="2200" dirty="0">
+                <a:latin typeface="Times New Roman" pitchFamily="18"/>
+              </a:rPr>
+              <a:t>To predict stock movement using the mined text data, do analytics on it and provide deeper insights simply not possible through numerical values.</a:t>
+            </a:r>
+          </a:p>
+          <a:p>
+            <a:pPr marL="342900" lvl="0" indent="-342900" algn="just">
+              <a:buClr>
+                <a:srgbClr val="EF2929"/>
+              </a:buClr>
+              <a:buSzPct val="45000"/>
+              <a:buFont typeface="Wingdings" panose="05000000000000000000" pitchFamily="2" charset="2"/>
+              <a:buChar char="Ø"/>
+            </a:pPr>
+            <a:r>
+              <a:rPr lang="en-IN" sz="2200" dirty="0">
+                <a:latin typeface="Times New Roman" pitchFamily="18"/>
+              </a:rPr>
+              <a:t>Apply transfer learning between textual and numerical datasets.</a:t>
+            </a:r>
+          </a:p>
+          <a:p>
+            <a:pPr marL="342900" lvl="0" indent="-342900" algn="just">
+              <a:buClr>
+                <a:srgbClr val="EF2929"/>
+              </a:buClr>
+              <a:buSzPct val="45000"/>
+              <a:buFont typeface="Wingdings" panose="05000000000000000000" pitchFamily="2" charset="2"/>
+              <a:buChar char="Ø"/>
+            </a:pPr>
+            <a:r>
+              <a:rPr lang="en-IN" sz="2200" dirty="0">
+                <a:latin typeface="Times New Roman" pitchFamily="18"/>
+              </a:rPr>
+              <a:t>To make sense of numerical stock data and predict using textual news data by incorporating algorithms of sentiment analysis and deep learning.</a:t>
+            </a:r>
+          </a:p>
+          <a:p>
+            <a:pPr marL="342900" lvl="0" indent="-342900" algn="just">
+              <a:buClr>
+                <a:srgbClr val="EF2929"/>
+              </a:buClr>
+              <a:buSzPct val="45000"/>
+              <a:buFont typeface="Wingdings" panose="05000000000000000000" pitchFamily="2" charset="2"/>
+              <a:buChar char="Ø"/>
+            </a:pPr>
+            <a:r>
+              <a:rPr lang="en-IN" sz="2200" dirty="0">
+                <a:latin typeface="Times New Roman" pitchFamily="18"/>
+              </a:rPr>
+              <a:t>Try to extend the project to use real-time stream data.</a:t>
+            </a:r>
+          </a:p>
+        </p:txBody>
+      </p:sp>
+    </p:spTree>
+  </p:cSld>
+  <p:clrMapOvr>
+    <a:masterClrMapping/>
+  </p:clrMapOvr>
+</p:sld>
+</file>
+
+<file path=ppt/slides/slide4.xml><?xml version="1.0" encoding="utf-8"?>
+<p:sld xmlns:a="http://schemas.openxmlformats.org/drawingml/2006/main" xmlns:r="http://schemas.openxmlformats.org/officeDocument/2006/relationships" xmlns:p="http://schemas.openxmlformats.org/presentationml/2006/main">
+  <p:cSld>
+    <p:spTree>
+      <p:nvGrpSpPr>
+        <p:cNvPr id="1" name=""/>
+        <p:cNvGrpSpPr/>
+        <p:nvPr/>
+      </p:nvGrpSpPr>
+      <p:grpSpPr>
+        <a:xfrm>
+          <a:off x="0" y="0"/>
+          <a:ext cx="0" cy="0"/>
+          <a:chOff x="0" y="0"/>
+          <a:chExt cx="0" cy="0"/>
+        </a:xfrm>
+      </p:grpSpPr>
+      <p:sp>
+        <p:nvSpPr>
+          <p:cNvPr id="2" name="Title 1">
+            <a:extLst>
+              <a:ext uri="{FF2B5EF4-FFF2-40B4-BE49-F238E27FC236}">
+                <a16:creationId xmlns:a16="http://schemas.microsoft.com/office/drawing/2014/main" id="{916A990D-B993-4176-9757-1161D5A03A18}"/>
+              </a:ext>
+            </a:extLst>
+          </p:cNvPr>
+          <p:cNvSpPr txBox="1">
+            <a:spLocks noGrp="1"/>
+          </p:cNvSpPr>
+          <p:nvPr>
+            <p:ph type="title" idx="4294967295"/>
+          </p:nvPr>
+        </p:nvSpPr>
+        <p:spPr>
+          <a:xfrm>
+            <a:off x="720360" y="288000"/>
+            <a:ext cx="8855640" cy="1262520"/>
+          </a:xfrm>
+        </p:spPr>
+        <p:txBody>
+          <a:bodyPr/>
+          <a:lstStyle/>
+          <a:p>
+            <a:pPr lvl="0"/>
+            <a:r>
+              <a:rPr lang="en-IN"/>
+              <a:t>Proposed System</a:t>
+            </a:r>
+          </a:p>
+        </p:txBody>
+      </p:sp>
+      <p:sp>
+        <p:nvSpPr>
+          <p:cNvPr id="3" name="Text Placeholder 2">
+            <a:extLst>
+              <a:ext uri="{FF2B5EF4-FFF2-40B4-BE49-F238E27FC236}">
+                <a16:creationId xmlns:a16="http://schemas.microsoft.com/office/drawing/2014/main" id="{5B1722C2-1584-40F8-8953-729E1660C438}"/>
+              </a:ext>
+            </a:extLst>
+          </p:cNvPr>
+          <p:cNvSpPr txBox="1">
+            <a:spLocks noGrp="1"/>
+          </p:cNvSpPr>
+          <p:nvPr>
+            <p:ph type="body" idx="4294967295"/>
+          </p:nvPr>
+        </p:nvSpPr>
+        <p:spPr>
+          <a:xfrm>
+            <a:off x="792000" y="1512000"/>
+            <a:ext cx="8640000" cy="5391218"/>
+          </a:xfrm>
+        </p:spPr>
+        <p:txBody>
+          <a:bodyPr>
+            <a:normAutofit lnSpcReduction="10000"/>
+          </a:bodyPr>
+          <a:lstStyle/>
+          <a:p>
+            <a:pPr marL="342900" lvl="0" indent="-342900" algn="just">
+              <a:buSzPct val="45000"/>
+              <a:buFont typeface="Wingdings" panose="05000000000000000000" pitchFamily="2" charset="2"/>
+              <a:buChar char="Ø"/>
+            </a:pPr>
+            <a:r>
+              <a:rPr lang="en-IN" sz="2200" dirty="0">
+                <a:latin typeface="Times New Roman" pitchFamily="18"/>
+                <a:cs typeface="Times New Roman" pitchFamily="18"/>
+              </a:rPr>
+              <a:t>We can see a pattern here - several studies have been done in the past to cumulate data from news sources and make predictions through it. The most popular use case is sentiment analysis where one can create surveys about user sentiments and use it to gain insights in political, business and educational domains.</a:t>
+            </a:r>
+          </a:p>
+          <a:p>
+            <a:pPr marL="342900" lvl="0" indent="-342900" algn="just">
+              <a:buSzPct val="45000"/>
+              <a:buFont typeface="Wingdings" panose="05000000000000000000" pitchFamily="2" charset="2"/>
+              <a:buChar char="Ø"/>
+            </a:pPr>
+            <a:r>
+              <a:rPr lang="en-IN" sz="2200" dirty="0">
+                <a:latin typeface="Times New Roman" pitchFamily="18"/>
+                <a:cs typeface="Times New Roman" pitchFamily="18"/>
+              </a:rPr>
+              <a:t>In the recent time, with the boom of social media, it is becoming easier to collect user data. For </a:t>
+            </a:r>
+            <a:r>
+              <a:rPr lang="en-IN" sz="2200" dirty="0" err="1">
+                <a:latin typeface="Times New Roman" pitchFamily="18"/>
+                <a:cs typeface="Times New Roman" pitchFamily="18"/>
+              </a:rPr>
+              <a:t>eg.</a:t>
+            </a:r>
+            <a:r>
+              <a:rPr lang="en-IN" sz="2200" dirty="0">
+                <a:latin typeface="Times New Roman" pitchFamily="18"/>
+                <a:cs typeface="Times New Roman" pitchFamily="18"/>
+              </a:rPr>
+              <a:t>, Facebook and Twitter publish some open user data every year for developers to make analysis on it (APIs). This was indeed the case when researchers at Facebook and Twitter partnered with US Security Forces, were analysing through individual posts in Syria to identify objectional content. This was done to screen out potential terrorists and curb terrorist activities.</a:t>
+            </a:r>
+          </a:p>
+          <a:p>
+            <a:pPr marL="342900" lvl="0" indent="-342900" algn="just">
+              <a:buSzPct val="45000"/>
+              <a:buFont typeface="Wingdings" panose="05000000000000000000" pitchFamily="2" charset="2"/>
+              <a:buChar char="Ø"/>
+            </a:pPr>
+            <a:r>
+              <a:rPr lang="en-IN" sz="2200" dirty="0">
+                <a:latin typeface="Times New Roman" pitchFamily="18"/>
+                <a:cs typeface="Times New Roman" pitchFamily="18"/>
+              </a:rPr>
+              <a:t>With such advances in mind, I look to implement a similar function to a business-related problem, mainly building a deep-learning based stock prediction mechanism using data from textual news articles.</a:t>
+            </a:r>
+          </a:p>
+        </p:txBody>
+      </p:sp>
+    </p:spTree>
+  </p:cSld>
+  <p:clrMapOvr>
+    <a:masterClrMapping/>
+  </p:clrMapOvr>
+</p:sld>
+</file>
+
+<file path=ppt/slides/slide5.xml><?xml version="1.0" encoding="utf-8"?>
+<p:sld xmlns:a="http://schemas.openxmlformats.org/drawingml/2006/main" xmlns:r="http://schemas.openxmlformats.org/officeDocument/2006/relationships" xmlns:p="http://schemas.openxmlformats.org/presentationml/2006/main">
+  <p:cSld>
+    <p:spTree>
+      <p:nvGrpSpPr>
+        <p:cNvPr id="1" name=""/>
+        <p:cNvGrpSpPr/>
+        <p:nvPr/>
+      </p:nvGrpSpPr>
+      <p:grpSpPr>
+        <a:xfrm>
+          <a:off x="0" y="0"/>
+          <a:ext cx="0" cy="0"/>
+          <a:chOff x="0" y="0"/>
+          <a:chExt cx="0" cy="0"/>
+        </a:xfrm>
+      </p:grpSpPr>
+      <p:sp>
+        <p:nvSpPr>
+          <p:cNvPr id="2" name="Title 1">
+            <a:extLst>
+              <a:ext uri="{FF2B5EF4-FFF2-40B4-BE49-F238E27FC236}">
+                <a16:creationId xmlns:a16="http://schemas.microsoft.com/office/drawing/2014/main" id="{8FBF803C-99C1-4A96-9BC4-9707D7D2A2FC}"/>
+              </a:ext>
+            </a:extLst>
+          </p:cNvPr>
+          <p:cNvSpPr txBox="1">
+            <a:spLocks noGrp="1"/>
+          </p:cNvSpPr>
+          <p:nvPr>
+            <p:ph type="title" idx="4294967295"/>
+          </p:nvPr>
+        </p:nvSpPr>
+        <p:spPr>
+          <a:xfrm>
+            <a:off x="720000" y="288000"/>
+            <a:ext cx="8855640" cy="1296000"/>
+          </a:xfrm>
+        </p:spPr>
+        <p:txBody>
+          <a:bodyPr/>
+          <a:lstStyle/>
+          <a:p>
+            <a:pPr lvl="0"/>
+            <a:r>
+              <a:rPr lang="en-IN" dirty="0"/>
+              <a:t>Proposed System (contd.)</a:t>
+            </a:r>
+          </a:p>
+        </p:txBody>
+      </p:sp>
+      <p:sp>
+        <p:nvSpPr>
+          <p:cNvPr id="3" name="Text Placeholder 2">
+            <a:extLst>
+              <a:ext uri="{FF2B5EF4-FFF2-40B4-BE49-F238E27FC236}">
+                <a16:creationId xmlns:a16="http://schemas.microsoft.com/office/drawing/2014/main" id="{A353C9DB-89B2-46FD-B0C1-540C7D8DEDE6}"/>
+              </a:ext>
+            </a:extLst>
+          </p:cNvPr>
+          <p:cNvSpPr txBox="1">
+            <a:spLocks noGrp="1"/>
+          </p:cNvSpPr>
+          <p:nvPr>
+            <p:ph type="body" idx="4294967295"/>
+          </p:nvPr>
+        </p:nvSpPr>
+        <p:spPr>
+          <a:xfrm>
+            <a:off x="720000" y="1962355"/>
+            <a:ext cx="8712000" cy="4991103"/>
+          </a:xfrm>
+        </p:spPr>
+        <p:txBody>
+          <a:bodyPr>
+            <a:normAutofit/>
+          </a:bodyPr>
+          <a:lstStyle/>
+          <a:p>
+            <a:pPr marL="342900" lvl="0" indent="-342900" algn="just" rtl="0">
+              <a:spcAft>
+                <a:spcPts val="0"/>
+              </a:spcAft>
+              <a:buClr>
+                <a:srgbClr val="EF2929"/>
+              </a:buClr>
+              <a:buSzPct val="45000"/>
+              <a:buFont typeface="Wingdings" panose="05000000000000000000" pitchFamily="2" charset="2"/>
+              <a:buChar char="Ø"/>
+            </a:pPr>
+            <a:r>
+              <a:rPr lang="en-IN" sz="2200" dirty="0">
+                <a:latin typeface="Times New Roman" pitchFamily="18"/>
+                <a:cs typeface="Times New Roman" pitchFamily="18"/>
+              </a:rPr>
+              <a:t>In this project, I propose to create an analysis cum prediction model to assess stock movements through scraping news articles. Here, I will be scraping stock related news articles, general business articles for certain companies whose stocks are prominent etc. I will then also scrap historical data of these company stocks from a finance website.</a:t>
+            </a:r>
+          </a:p>
+          <a:p>
+            <a:pPr marL="342900" lvl="0" indent="-342900" algn="just" rtl="0">
+              <a:spcAft>
+                <a:spcPts val="0"/>
+              </a:spcAft>
+              <a:buClr>
+                <a:srgbClr val="EF2929"/>
+              </a:buClr>
+              <a:buSzPct val="45000"/>
+              <a:buFont typeface="Wingdings" panose="05000000000000000000" pitchFamily="2" charset="2"/>
+              <a:buChar char="Ø"/>
+            </a:pPr>
+            <a:endParaRPr lang="en-IN" sz="2200" dirty="0">
+              <a:latin typeface="Times New Roman" pitchFamily="18"/>
+              <a:cs typeface="Times New Roman" pitchFamily="18"/>
+            </a:endParaRPr>
+          </a:p>
+          <a:p>
+            <a:pPr marL="342900" lvl="0" indent="-342900" algn="just" rtl="0">
+              <a:spcAft>
+                <a:spcPts val="0"/>
+              </a:spcAft>
+              <a:buClr>
+                <a:srgbClr val="EF2929"/>
+              </a:buClr>
+              <a:buSzPct val="45000"/>
+              <a:buFont typeface="Wingdings" panose="05000000000000000000" pitchFamily="2" charset="2"/>
+              <a:buChar char="Ø"/>
+            </a:pPr>
+            <a:r>
+              <a:rPr lang="en-IN" sz="2200" dirty="0">
+                <a:latin typeface="Times New Roman" pitchFamily="18"/>
+                <a:cs typeface="Times New Roman" pitchFamily="18"/>
+              </a:rPr>
+              <a:t>So, I will be working with a mixture of textual as well as numeric data. This will correspond to 2 different datasets. Now there will be a propagation of knowledge between the datasets, where I plan to use sentiment analysis on the textual data and use that to predict a “mood” index, which in turn will decide how the next day stock forecast will change.</a:t>
+            </a:r>
+          </a:p>
+        </p:txBody>
+      </p:sp>
+    </p:spTree>
+  </p:cSld>
+  <p:clrMapOvr>
+    <a:masterClrMapping/>
+  </p:clrMapOvr>
+</p:sld>
+</file>
+
+<file path=ppt/slides/slide6.xml><?xml version="1.0" encoding="utf-8"?>
+<p:sld xmlns:a="http://schemas.openxmlformats.org/drawingml/2006/main" xmlns:r="http://schemas.openxmlformats.org/officeDocument/2006/relationships" xmlns:p="http://schemas.openxmlformats.org/presentationml/2006/main">
+  <p:cSld>
+    <p:spTree>
+      <p:nvGrpSpPr>
+        <p:cNvPr id="1" name=""/>
+        <p:cNvGrpSpPr/>
+        <p:nvPr/>
+      </p:nvGrpSpPr>
+      <p:grpSpPr>
+        <a:xfrm>
+          <a:off x="0" y="0"/>
+          <a:ext cx="0" cy="0"/>
+          <a:chOff x="0" y="0"/>
+          <a:chExt cx="0" cy="0"/>
+        </a:xfrm>
+      </p:grpSpPr>
+      <p:sp>
+        <p:nvSpPr>
+          <p:cNvPr id="2" name="Title 1">
+            <a:extLst>
+              <a:ext uri="{FF2B5EF4-FFF2-40B4-BE49-F238E27FC236}">
+                <a16:creationId xmlns:a16="http://schemas.microsoft.com/office/drawing/2014/main" id="{CC1B5F2A-8092-40B8-86B2-F1626C062D99}"/>
+              </a:ext>
+            </a:extLst>
+          </p:cNvPr>
+          <p:cNvSpPr txBox="1">
+            <a:spLocks noGrp="1"/>
+          </p:cNvSpPr>
+          <p:nvPr>
+            <p:ph type="title" idx="4294967295"/>
+          </p:nvPr>
+        </p:nvSpPr>
+        <p:spPr>
+          <a:xfrm>
+            <a:off x="792000" y="265529"/>
+            <a:ext cx="8568000" cy="1440000"/>
+          </a:xfrm>
+        </p:spPr>
+        <p:txBody>
+          <a:bodyPr>
+            <a:spAutoFit/>
+          </a:bodyPr>
+          <a:lstStyle/>
+          <a:p>
+            <a:pPr lvl="0"/>
+            <a:r>
+              <a:rPr lang="en-IN" dirty="0"/>
+              <a:t>Proposed System (contd.)</a:t>
+            </a:r>
+          </a:p>
+        </p:txBody>
+      </p:sp>
+      <p:sp>
+        <p:nvSpPr>
+          <p:cNvPr id="3" name="Text Placeholder 2">
+            <a:extLst>
+              <a:ext uri="{FF2B5EF4-FFF2-40B4-BE49-F238E27FC236}">
+                <a16:creationId xmlns:a16="http://schemas.microsoft.com/office/drawing/2014/main" id="{306324A3-72B4-4C81-97F3-E17D8AA09E90}"/>
+              </a:ext>
+            </a:extLst>
+          </p:cNvPr>
+          <p:cNvSpPr txBox="1">
+            <a:spLocks noGrp="1"/>
+          </p:cNvSpPr>
+          <p:nvPr>
+            <p:ph type="body" idx="4294967295"/>
+          </p:nvPr>
+        </p:nvSpPr>
+        <p:spPr>
+          <a:xfrm>
+            <a:off x="792000" y="1855347"/>
+            <a:ext cx="8568000" cy="4314061"/>
+          </a:xfrm>
+        </p:spPr>
+        <p:txBody>
+          <a:bodyPr>
+            <a:normAutofit/>
+          </a:bodyPr>
+          <a:lstStyle/>
+          <a:p>
+            <a:pPr marL="342900" lvl="0" indent="-342900" algn="just" rtl="0">
+              <a:spcAft>
+                <a:spcPts val="0"/>
+              </a:spcAft>
+              <a:buClr>
+                <a:srgbClr val="EF2929"/>
+              </a:buClr>
+              <a:buSzPct val="45000"/>
+              <a:buFont typeface="Wingdings" panose="05000000000000000000" pitchFamily="2" charset="2"/>
+              <a:buChar char="Ø"/>
+            </a:pPr>
+            <a:r>
+              <a:rPr lang="en-IN" sz="2200" dirty="0">
+                <a:latin typeface="Times New Roman" pitchFamily="18"/>
+                <a:cs typeface="Times New Roman" pitchFamily="18"/>
+              </a:rPr>
+              <a:t>Previous works have already made prediction models for this problem, but there, stocks have been previously updated and predicted using a time series model where there is a continuous stream of daily highs and lows for a given number of stocks over a period of time using conventional machine learning models.</a:t>
+            </a:r>
+          </a:p>
+          <a:p>
+            <a:pPr marL="342900" lvl="0" indent="-342900" algn="just" rtl="0">
+              <a:spcAft>
+                <a:spcPts val="0"/>
+              </a:spcAft>
+              <a:buClr>
+                <a:srgbClr val="EF2929"/>
+              </a:buClr>
+              <a:buSzPct val="45000"/>
+              <a:buFont typeface="Wingdings" panose="05000000000000000000" pitchFamily="2" charset="2"/>
+              <a:buChar char="Ø"/>
+            </a:pPr>
+            <a:endParaRPr lang="en-IN" sz="2200" dirty="0">
+              <a:latin typeface="Times New Roman" pitchFamily="18"/>
+              <a:cs typeface="Times New Roman" pitchFamily="18"/>
+            </a:endParaRPr>
+          </a:p>
+          <a:p>
+            <a:pPr marL="342900" lvl="0" indent="-342900" algn="just">
+              <a:buClr>
+                <a:srgbClr val="EF2929"/>
+              </a:buClr>
+              <a:buSzPct val="45000"/>
+              <a:buFont typeface="Wingdings" panose="05000000000000000000" pitchFamily="2" charset="2"/>
+              <a:buChar char="Ø"/>
+            </a:pPr>
+            <a:r>
+              <a:rPr lang="en-IN" sz="2200" dirty="0">
+                <a:latin typeface="Times New Roman" pitchFamily="18"/>
+                <a:cs typeface="Times New Roman" pitchFamily="18"/>
+              </a:rPr>
+              <a:t>The novelty in my work is that I am using 2 completely different parameters to predict stocks, that are news as well as time series. This model will then be trained over a neural net using TensorFlow.</a:t>
+            </a:r>
+          </a:p>
+        </p:txBody>
+      </p:sp>
+    </p:spTree>
+  </p:cSld>
+  <p:clrMapOvr>
+    <a:masterClrMapping/>
+  </p:clrMapOvr>
+</p:sld>
+</file>
+
+<file path=ppt/slides/slide7.xml><?xml version="1.0" encoding="utf-8"?>
 <p:sld xmlns:a="http://schemas.openxmlformats.org/drawingml/2006/main" xmlns:r="http://schemas.openxmlformats.org/officeDocument/2006/relationships" xmlns:p="http://schemas.openxmlformats.org/presentationml/2006/main">
   <p:cSld name="page11">
     <p:spTree>
@@ -10252,7 +12609,7 @@
 </p:sld>
 </file>
 
-<file path=ppt/slides/slide3.xml><?xml version="1.0" encoding="utf-8"?>
+<file path=ppt/slides/slide8.xml><?xml version="1.0" encoding="utf-8"?>
 <p:sld xmlns:a="http://schemas.openxmlformats.org/drawingml/2006/main" xmlns:r="http://schemas.openxmlformats.org/officeDocument/2006/relationships" xmlns:p="http://schemas.openxmlformats.org/presentationml/2006/main">
   <p:cSld name="page13">
     <p:spTree>
@@ -10414,7 +12771,7 @@
 </p:sld>
 </file>
 
-<file path=ppt/slides/slide4.xml><?xml version="1.0" encoding="utf-8"?>
+<file path=ppt/slides/slide9.xml><?xml version="1.0" encoding="utf-8"?>
 <p:sld xmlns:a="http://schemas.openxmlformats.org/drawingml/2006/main" xmlns:r="http://schemas.openxmlformats.org/officeDocument/2006/relationships" xmlns:p="http://schemas.openxmlformats.org/presentationml/2006/main">
   <p:cSld name="page14">
     <p:spTree>
@@ -10580,724 +12937,6 @@
         </p:txBody>
       </p:sp>
     </p:spTree>
-  </p:cSld>
-  <p:clrMapOvr>
-    <a:masterClrMapping/>
-  </p:clrMapOvr>
-</p:sld>
-</file>
-
-<file path=ppt/slides/slide5.xml><?xml version="1.0" encoding="utf-8"?>
-<p:sld xmlns:a="http://schemas.openxmlformats.org/drawingml/2006/main" xmlns:r="http://schemas.openxmlformats.org/officeDocument/2006/relationships" xmlns:p="http://schemas.openxmlformats.org/presentationml/2006/main">
-  <p:cSld name="page15">
-    <p:spTree>
-      <p:nvGrpSpPr>
-        <p:cNvPr id="1" name=""/>
-        <p:cNvGrpSpPr/>
-        <p:nvPr/>
-      </p:nvGrpSpPr>
-      <p:grpSpPr>
-        <a:xfrm>
-          <a:off x="0" y="0"/>
-          <a:ext cx="0" cy="0"/>
-          <a:chOff x="0" y="0"/>
-          <a:chExt cx="0" cy="0"/>
-        </a:xfrm>
-      </p:grpSpPr>
-      <p:pic>
-        <p:nvPicPr>
-          <p:cNvPr id="2" name="Picture 1">
-            <a:extLst>
-              <a:ext uri="{FF2B5EF4-FFF2-40B4-BE49-F238E27FC236}">
-                <a16:creationId xmlns:a16="http://schemas.microsoft.com/office/drawing/2014/main" id="{30D47C88-7C63-4885-9888-325CF69DEF71}"/>
-              </a:ext>
-            </a:extLst>
-          </p:cNvPr>
-          <p:cNvPicPr>
-            <a:picLocks noChangeAspect="1"/>
-          </p:cNvPicPr>
-          <p:nvPr/>
-        </p:nvPicPr>
-        <p:blipFill>
-          <a:blip r:embed="rId3">
-            <a:lum/>
-            <a:alphaModFix/>
-          </a:blip>
-          <a:srcRect/>
-          <a:stretch>
-            <a:fillRect/>
-          </a:stretch>
-        </p:blipFill>
-        <p:spPr>
-          <a:xfrm>
-            <a:off x="648000" y="16559"/>
-            <a:ext cx="4927122" cy="3763277"/>
-          </a:xfrm>
-          <a:prstGeom prst="rect">
-            <a:avLst/>
-          </a:prstGeom>
-          <a:noFill/>
-          <a:ln>
-            <a:noFill/>
-          </a:ln>
-        </p:spPr>
-      </p:pic>
-      <p:pic>
-        <p:nvPicPr>
-          <p:cNvPr id="3" name="Picture 2">
-            <a:extLst>
-              <a:ext uri="{FF2B5EF4-FFF2-40B4-BE49-F238E27FC236}">
-                <a16:creationId xmlns:a16="http://schemas.microsoft.com/office/drawing/2014/main" id="{E8282192-1BD8-4045-BF85-616EB88F7DA3}"/>
-              </a:ext>
-            </a:extLst>
-          </p:cNvPr>
-          <p:cNvPicPr>
-            <a:picLocks noChangeAspect="1"/>
-          </p:cNvPicPr>
-          <p:nvPr/>
-        </p:nvPicPr>
-        <p:blipFill>
-          <a:blip r:embed="rId4">
-            <a:lum/>
-            <a:alphaModFix/>
-          </a:blip>
-          <a:srcRect/>
-          <a:stretch>
-            <a:fillRect/>
-          </a:stretch>
-        </p:blipFill>
-        <p:spPr>
-          <a:xfrm>
-            <a:off x="2647278" y="3779836"/>
-            <a:ext cx="7432721" cy="3753524"/>
-          </a:xfrm>
-          <a:prstGeom prst="rect">
-            <a:avLst/>
-          </a:prstGeom>
-          <a:noFill/>
-          <a:ln>
-            <a:noFill/>
-          </a:ln>
-        </p:spPr>
-      </p:pic>
-      <p:sp>
-        <p:nvSpPr>
-          <p:cNvPr id="5" name="TextBox 4">
-            <a:extLst>
-              <a:ext uri="{FF2B5EF4-FFF2-40B4-BE49-F238E27FC236}">
-                <a16:creationId xmlns:a16="http://schemas.microsoft.com/office/drawing/2014/main" id="{9B1FCB55-B132-4FB3-8E30-7EEFB9AF83AD}"/>
-              </a:ext>
-            </a:extLst>
-          </p:cNvPr>
-          <p:cNvSpPr txBox="1"/>
-          <p:nvPr/>
-        </p:nvSpPr>
-        <p:spPr>
-          <a:xfrm>
-            <a:off x="6060813" y="968827"/>
-            <a:ext cx="3004457" cy="830997"/>
-          </a:xfrm>
-          <a:prstGeom prst="rect">
-            <a:avLst/>
-          </a:prstGeom>
-          <a:noFill/>
-        </p:spPr>
-        <p:txBody>
-          <a:bodyPr wrap="square" rtlCol="0">
-            <a:spAutoFit/>
-          </a:bodyPr>
-          <a:lstStyle/>
-          <a:p>
-            <a:r>
-              <a:rPr lang="en-US" sz="1600" dirty="0"/>
-              <a:t>Apple Stock trend – returns graphed for the scraped time period by standardized formula</a:t>
-            </a:r>
-            <a:endParaRPr lang="en-IN" sz="1600" dirty="0"/>
-          </a:p>
-        </p:txBody>
-      </p:sp>
-      <p:sp>
-        <p:nvSpPr>
-          <p:cNvPr id="6" name="TextBox 5">
-            <a:extLst>
-              <a:ext uri="{FF2B5EF4-FFF2-40B4-BE49-F238E27FC236}">
-                <a16:creationId xmlns:a16="http://schemas.microsoft.com/office/drawing/2014/main" id="{F50CD191-4F2A-4308-920C-C3D14B12E46F}"/>
-              </a:ext>
-            </a:extLst>
-          </p:cNvPr>
-          <p:cNvSpPr txBox="1"/>
-          <p:nvPr/>
-        </p:nvSpPr>
-        <p:spPr>
-          <a:xfrm>
-            <a:off x="107104" y="5656598"/>
-            <a:ext cx="3004457" cy="584775"/>
-          </a:xfrm>
-          <a:prstGeom prst="rect">
-            <a:avLst/>
-          </a:prstGeom>
-          <a:noFill/>
-        </p:spPr>
-        <p:txBody>
-          <a:bodyPr wrap="square" rtlCol="0">
-            <a:spAutoFit/>
-          </a:bodyPr>
-          <a:lstStyle/>
-          <a:p>
-            <a:r>
-              <a:rPr lang="en-US" sz="1600" dirty="0"/>
-              <a:t>Correlation between Apple and Google stock</a:t>
-            </a:r>
-            <a:endParaRPr lang="en-IN" sz="1600" dirty="0"/>
-          </a:p>
-        </p:txBody>
-      </p:sp>
-    </p:spTree>
-  </p:cSld>
-  <p:clrMapOvr>
-    <a:masterClrMapping/>
-  </p:clrMapOvr>
-</p:sld>
-</file>
-
-<file path=ppt/slides/slide6.xml><?xml version="1.0" encoding="utf-8"?>
-<p:sld xmlns:a="http://schemas.openxmlformats.org/drawingml/2006/main" xmlns:r="http://schemas.openxmlformats.org/officeDocument/2006/relationships" xmlns:p="http://schemas.openxmlformats.org/presentationml/2006/main">
-  <p:cSld name="page16">
-    <p:spTree>
-      <p:nvGrpSpPr>
-        <p:cNvPr id="1" name=""/>
-        <p:cNvGrpSpPr/>
-        <p:nvPr/>
-      </p:nvGrpSpPr>
-      <p:grpSpPr>
-        <a:xfrm>
-          <a:off x="0" y="0"/>
-          <a:ext cx="0" cy="0"/>
-          <a:chOff x="0" y="0"/>
-          <a:chExt cx="0" cy="0"/>
-        </a:xfrm>
-      </p:grpSpPr>
-      <p:pic>
-        <p:nvPicPr>
-          <p:cNvPr id="2" name="Picture 1">
-            <a:extLst>
-              <a:ext uri="{FF2B5EF4-FFF2-40B4-BE49-F238E27FC236}">
-                <a16:creationId xmlns:a16="http://schemas.microsoft.com/office/drawing/2014/main" id="{B07515F3-F6F9-42DB-900A-E694F13D8A9D}"/>
-              </a:ext>
-            </a:extLst>
-          </p:cNvPr>
-          <p:cNvPicPr>
-            <a:picLocks noChangeAspect="1"/>
-          </p:cNvPicPr>
-          <p:nvPr/>
-        </p:nvPicPr>
-        <p:blipFill>
-          <a:blip r:embed="rId3">
-            <a:lum/>
-            <a:alphaModFix/>
-          </a:blip>
-          <a:srcRect/>
-          <a:stretch>
-            <a:fillRect/>
-          </a:stretch>
-        </p:blipFill>
-        <p:spPr>
-          <a:xfrm>
-            <a:off x="2641585" y="0"/>
-            <a:ext cx="7439040" cy="6696000"/>
-          </a:xfrm>
-          <a:prstGeom prst="rect">
-            <a:avLst/>
-          </a:prstGeom>
-          <a:noFill/>
-          <a:ln>
-            <a:noFill/>
-          </a:ln>
-        </p:spPr>
-      </p:pic>
-      <p:sp>
-        <p:nvSpPr>
-          <p:cNvPr id="4" name="TextBox 3">
-            <a:extLst>
-              <a:ext uri="{FF2B5EF4-FFF2-40B4-BE49-F238E27FC236}">
-                <a16:creationId xmlns:a16="http://schemas.microsoft.com/office/drawing/2014/main" id="{7285603A-BC4C-4064-8DC7-96BAB555B290}"/>
-              </a:ext>
-            </a:extLst>
-          </p:cNvPr>
-          <p:cNvSpPr txBox="1"/>
-          <p:nvPr/>
-        </p:nvSpPr>
-        <p:spPr>
-          <a:xfrm>
-            <a:off x="95441" y="3156856"/>
-            <a:ext cx="3004457" cy="584775"/>
-          </a:xfrm>
-          <a:prstGeom prst="rect">
-            <a:avLst/>
-          </a:prstGeom>
-          <a:noFill/>
-        </p:spPr>
-        <p:txBody>
-          <a:bodyPr wrap="square" rtlCol="0">
-            <a:spAutoFit/>
-          </a:bodyPr>
-          <a:lstStyle/>
-          <a:p>
-            <a:r>
-              <a:rPr lang="en-US" sz="1600" dirty="0"/>
-              <a:t>Correlation Scatter Matrix between the dominant stocks</a:t>
-            </a:r>
-            <a:endParaRPr lang="en-IN" sz="1600" dirty="0"/>
-          </a:p>
-        </p:txBody>
-      </p:sp>
-    </p:spTree>
-  </p:cSld>
-  <p:clrMapOvr>
-    <a:masterClrMapping/>
-  </p:clrMapOvr>
-</p:sld>
-</file>
-
-<file path=ppt/slides/slide7.xml><?xml version="1.0" encoding="utf-8"?>
-<p:sld xmlns:a="http://schemas.openxmlformats.org/drawingml/2006/main" xmlns:r="http://schemas.openxmlformats.org/officeDocument/2006/relationships" xmlns:p="http://schemas.openxmlformats.org/presentationml/2006/main">
-  <p:cSld>
-    <p:spTree>
-      <p:nvGrpSpPr>
-        <p:cNvPr id="1" name=""/>
-        <p:cNvGrpSpPr/>
-        <p:nvPr/>
-      </p:nvGrpSpPr>
-      <p:grpSpPr>
-        <a:xfrm>
-          <a:off x="0" y="0"/>
-          <a:ext cx="0" cy="0"/>
-          <a:chOff x="0" y="0"/>
-          <a:chExt cx="0" cy="0"/>
-        </a:xfrm>
-      </p:grpSpPr>
-      <p:sp>
-        <p:nvSpPr>
-          <p:cNvPr id="2" name="Title 1">
-            <a:extLst>
-              <a:ext uri="{FF2B5EF4-FFF2-40B4-BE49-F238E27FC236}">
-                <a16:creationId xmlns:a16="http://schemas.microsoft.com/office/drawing/2014/main" id="{9668187A-481C-4573-89BC-8AAD466C0841}"/>
-              </a:ext>
-            </a:extLst>
-          </p:cNvPr>
-          <p:cNvSpPr>
-            <a:spLocks noGrp="1"/>
-          </p:cNvSpPr>
-          <p:nvPr>
-            <p:ph type="title"/>
-          </p:nvPr>
-        </p:nvSpPr>
-        <p:spPr/>
-        <p:txBody>
-          <a:bodyPr/>
-          <a:lstStyle/>
-          <a:p>
-            <a:r>
-              <a:rPr lang="en-US" dirty="0"/>
-              <a:t>Text News Extraction</a:t>
-            </a:r>
-            <a:endParaRPr lang="en-IN" dirty="0"/>
-          </a:p>
-        </p:txBody>
-      </p:sp>
-      <p:sp>
-        <p:nvSpPr>
-          <p:cNvPr id="3" name="Content Placeholder 2">
-            <a:extLst>
-              <a:ext uri="{FF2B5EF4-FFF2-40B4-BE49-F238E27FC236}">
-                <a16:creationId xmlns:a16="http://schemas.microsoft.com/office/drawing/2014/main" id="{75C8A65D-8EE3-4A93-9347-5451A45E2E57}"/>
-              </a:ext>
-            </a:extLst>
-          </p:cNvPr>
-          <p:cNvSpPr>
-            <a:spLocks noGrp="1"/>
-          </p:cNvSpPr>
-          <p:nvPr>
-            <p:ph idx="1"/>
-          </p:nvPr>
-        </p:nvSpPr>
-        <p:spPr>
-          <a:xfrm>
-            <a:off x="720000" y="1808307"/>
-            <a:ext cx="8640000" cy="4384800"/>
-          </a:xfrm>
-        </p:spPr>
-        <p:txBody>
-          <a:bodyPr/>
-          <a:lstStyle/>
-          <a:p>
-            <a:pPr marL="457200" indent="-457200">
-              <a:buFont typeface="Arial" panose="020B0604020202020204" pitchFamily="34" charset="0"/>
-              <a:buChar char="•"/>
-            </a:pPr>
-            <a:r>
-              <a:rPr lang="en-US" dirty="0"/>
-              <a:t>Collected data from Reuters and NASDAQ, 2 very popular websites producing finance and stock news. </a:t>
-            </a:r>
-          </a:p>
-          <a:p>
-            <a:pPr marL="457200" indent="-457200">
-              <a:buFont typeface="Arial" panose="020B0604020202020204" pitchFamily="34" charset="0"/>
-              <a:buChar char="•"/>
-            </a:pPr>
-            <a:r>
-              <a:rPr lang="en-US" dirty="0"/>
-              <a:t>Used </a:t>
-            </a:r>
-            <a:r>
-              <a:rPr lang="en-US" dirty="0" err="1"/>
-              <a:t>BeautifulSoup</a:t>
-            </a:r>
-            <a:r>
-              <a:rPr lang="en-US" dirty="0"/>
-              <a:t> to scrape the web pages and stored them into csv files.</a:t>
-            </a:r>
-          </a:p>
-          <a:p>
-            <a:pPr marL="457200" indent="-457200">
-              <a:buFont typeface="Arial" panose="020B0604020202020204" pitchFamily="34" charset="0"/>
-              <a:buChar char="•"/>
-            </a:pPr>
-            <a:r>
-              <a:rPr lang="en-US" dirty="0"/>
-              <a:t>Files named “date” wise, containing all the news published that day by the news sources.</a:t>
-            </a:r>
-          </a:p>
-          <a:p>
-            <a:pPr marL="457200" indent="-457200">
-              <a:buFont typeface="Arial" panose="020B0604020202020204" pitchFamily="34" charset="0"/>
-              <a:buChar char="•"/>
-            </a:pPr>
-            <a:r>
-              <a:rPr lang="en-US" dirty="0"/>
-              <a:t>Each file will have </a:t>
-            </a:r>
-            <a:r>
-              <a:rPr lang="en-US" dirty="0" err="1"/>
-              <a:t>atleast</a:t>
-            </a:r>
-            <a:r>
-              <a:rPr lang="en-US" dirty="0"/>
-              <a:t> 1 news of 1 stock ticker.</a:t>
-            </a:r>
-          </a:p>
-          <a:p>
-            <a:pPr marL="457200" indent="-457200">
-              <a:buFont typeface="Arial" panose="020B0604020202020204" pitchFamily="34" charset="0"/>
-              <a:buChar char="•"/>
-            </a:pPr>
-            <a:r>
-              <a:rPr lang="en-US" dirty="0"/>
-              <a:t>Not necessary that each </a:t>
-            </a:r>
-            <a:r>
-              <a:rPr lang="en-US" dirty="0" err="1"/>
-              <a:t>each</a:t>
-            </a:r>
-            <a:r>
-              <a:rPr lang="en-US" dirty="0"/>
-              <a:t> will have some news on a daily basis</a:t>
-            </a:r>
-            <a:endParaRPr lang="en-IN" dirty="0"/>
-          </a:p>
-        </p:txBody>
-      </p:sp>
-    </p:spTree>
-    <p:extLst>
-      <p:ext uri="{BB962C8B-B14F-4D97-AF65-F5344CB8AC3E}">
-        <p14:creationId xmlns:p14="http://schemas.microsoft.com/office/powerpoint/2010/main" val="2714015408"/>
-      </p:ext>
-    </p:extLst>
-  </p:cSld>
-  <p:clrMapOvr>
-    <a:masterClrMapping/>
-  </p:clrMapOvr>
-</p:sld>
-</file>
-
-<file path=ppt/slides/slide8.xml><?xml version="1.0" encoding="utf-8"?>
-<p:sld xmlns:a="http://schemas.openxmlformats.org/drawingml/2006/main" xmlns:r="http://schemas.openxmlformats.org/officeDocument/2006/relationships" xmlns:p="http://schemas.openxmlformats.org/presentationml/2006/main">
-  <p:cSld>
-    <p:spTree>
-      <p:nvGrpSpPr>
-        <p:cNvPr id="1" name=""/>
-        <p:cNvGrpSpPr/>
-        <p:nvPr/>
-      </p:nvGrpSpPr>
-      <p:grpSpPr>
-        <a:xfrm>
-          <a:off x="0" y="0"/>
-          <a:ext cx="0" cy="0"/>
-          <a:chOff x="0" y="0"/>
-          <a:chExt cx="0" cy="0"/>
-        </a:xfrm>
-      </p:grpSpPr>
-      <p:sp>
-        <p:nvSpPr>
-          <p:cNvPr id="2" name="Title 1">
-            <a:extLst>
-              <a:ext uri="{FF2B5EF4-FFF2-40B4-BE49-F238E27FC236}">
-                <a16:creationId xmlns:a16="http://schemas.microsoft.com/office/drawing/2014/main" id="{AED430CA-1465-48A0-AF4A-4AB0BB59A4F1}"/>
-              </a:ext>
-            </a:extLst>
-          </p:cNvPr>
-          <p:cNvSpPr>
-            <a:spLocks noGrp="1"/>
-          </p:cNvSpPr>
-          <p:nvPr>
-            <p:ph type="title"/>
-          </p:nvPr>
-        </p:nvSpPr>
-        <p:spPr/>
-        <p:txBody>
-          <a:bodyPr/>
-          <a:lstStyle/>
-          <a:p>
-            <a:r>
-              <a:rPr lang="en-US" dirty="0"/>
-              <a:t>Data Preprocessing</a:t>
-            </a:r>
-            <a:endParaRPr lang="en-IN" dirty="0"/>
-          </a:p>
-        </p:txBody>
-      </p:sp>
-      <p:sp>
-        <p:nvSpPr>
-          <p:cNvPr id="3" name="Content Placeholder 2">
-            <a:extLst>
-              <a:ext uri="{FF2B5EF4-FFF2-40B4-BE49-F238E27FC236}">
-                <a16:creationId xmlns:a16="http://schemas.microsoft.com/office/drawing/2014/main" id="{D504DDDC-1AEB-49D8-A0BD-F63564AB7F12}"/>
-              </a:ext>
-            </a:extLst>
-          </p:cNvPr>
-          <p:cNvSpPr>
-            <a:spLocks noGrp="1"/>
-          </p:cNvSpPr>
-          <p:nvPr>
-            <p:ph idx="1"/>
-          </p:nvPr>
-        </p:nvSpPr>
-        <p:spPr>
-          <a:xfrm>
-            <a:off x="720000" y="1748017"/>
-            <a:ext cx="8640000" cy="4384800"/>
-          </a:xfrm>
-        </p:spPr>
-        <p:txBody>
-          <a:bodyPr/>
-          <a:lstStyle/>
-          <a:p>
-            <a:pPr marL="457200" indent="-457200">
-              <a:buFont typeface="Arial" panose="020B0604020202020204" pitchFamily="34" charset="0"/>
-              <a:buChar char="•"/>
-            </a:pPr>
-            <a:r>
-              <a:rPr lang="en-US" dirty="0"/>
-              <a:t>Longest part of the entire project timeline. Still under revisions.</a:t>
-            </a:r>
-          </a:p>
-          <a:p>
-            <a:pPr marL="457200" indent="-457200">
-              <a:buFont typeface="Arial" panose="020B0604020202020204" pitchFamily="34" charset="0"/>
-              <a:buChar char="•"/>
-            </a:pPr>
-            <a:r>
-              <a:rPr lang="en-US" dirty="0"/>
-              <a:t>Rescaled numerical stock data to smaller dimensions, removing all redundant columns thus, leading to dimension reduction from 14 to 8.</a:t>
-            </a:r>
-          </a:p>
-          <a:p>
-            <a:pPr marL="457200" indent="-457200">
-              <a:buFont typeface="Arial" panose="020B0604020202020204" pitchFamily="34" charset="0"/>
-              <a:buChar char="•"/>
-            </a:pPr>
-            <a:r>
-              <a:rPr lang="en-US" dirty="0"/>
-              <a:t>Final stock data used for analytics contains the following columns : [Date, Symbol, High, Low, Open, Close, Volume and </a:t>
-            </a:r>
-            <a:r>
-              <a:rPr lang="en-US" dirty="0" err="1"/>
-              <a:t>AdjClose</a:t>
-            </a:r>
-            <a:r>
-              <a:rPr lang="en-US" dirty="0"/>
-              <a:t>]</a:t>
-            </a:r>
-          </a:p>
-          <a:p>
-            <a:pPr marL="457200" indent="-457200">
-              <a:buFont typeface="Arial" panose="020B0604020202020204" pitchFamily="34" charset="0"/>
-              <a:buChar char="•"/>
-            </a:pPr>
-            <a:r>
-              <a:rPr lang="en-US" dirty="0"/>
-              <a:t>Cleaned text news off random ads by filtering out unnecessary keys in JSON. </a:t>
-            </a:r>
-          </a:p>
-          <a:p>
-            <a:pPr marL="457200" indent="-457200">
-              <a:buFont typeface="Arial" panose="020B0604020202020204" pitchFamily="34" charset="0"/>
-              <a:buChar char="•"/>
-            </a:pPr>
-            <a:endParaRPr lang="en-US" dirty="0"/>
-          </a:p>
-          <a:p>
-            <a:pPr marL="457200" indent="-457200">
-              <a:buFont typeface="Arial" panose="020B0604020202020204" pitchFamily="34" charset="0"/>
-              <a:buChar char="•"/>
-            </a:pPr>
-            <a:endParaRPr lang="en-IN" dirty="0"/>
-          </a:p>
-        </p:txBody>
-      </p:sp>
-    </p:spTree>
-    <p:extLst>
-      <p:ext uri="{BB962C8B-B14F-4D97-AF65-F5344CB8AC3E}">
-        <p14:creationId xmlns:p14="http://schemas.microsoft.com/office/powerpoint/2010/main" val="3839025562"/>
-      </p:ext>
-    </p:extLst>
-  </p:cSld>
-  <p:clrMapOvr>
-    <a:masterClrMapping/>
-  </p:clrMapOvr>
-</p:sld>
-</file>
-
-<file path=ppt/slides/slide9.xml><?xml version="1.0" encoding="utf-8"?>
-<p:sld xmlns:a="http://schemas.openxmlformats.org/drawingml/2006/main" xmlns:r="http://schemas.openxmlformats.org/officeDocument/2006/relationships" xmlns:p="http://schemas.openxmlformats.org/presentationml/2006/main">
-  <p:cSld>
-    <p:spTree>
-      <p:nvGrpSpPr>
-        <p:cNvPr id="1" name=""/>
-        <p:cNvGrpSpPr/>
-        <p:nvPr/>
-      </p:nvGrpSpPr>
-      <p:grpSpPr>
-        <a:xfrm>
-          <a:off x="0" y="0"/>
-          <a:ext cx="0" cy="0"/>
-          <a:chOff x="0" y="0"/>
-          <a:chExt cx="0" cy="0"/>
-        </a:xfrm>
-      </p:grpSpPr>
-      <p:sp>
-        <p:nvSpPr>
-          <p:cNvPr id="2" name="Title 1">
-            <a:extLst>
-              <a:ext uri="{FF2B5EF4-FFF2-40B4-BE49-F238E27FC236}">
-                <a16:creationId xmlns:a16="http://schemas.microsoft.com/office/drawing/2014/main" id="{D4661BB8-4FD3-4E0F-AA65-93DD212C479E}"/>
-              </a:ext>
-            </a:extLst>
-          </p:cNvPr>
-          <p:cNvSpPr>
-            <a:spLocks noGrp="1"/>
-          </p:cNvSpPr>
-          <p:nvPr>
-            <p:ph type="title"/>
-          </p:nvPr>
-        </p:nvSpPr>
-        <p:spPr/>
-        <p:txBody>
-          <a:bodyPr/>
-          <a:lstStyle/>
-          <a:p>
-            <a:r>
-              <a:rPr lang="en-US" dirty="0"/>
-              <a:t>Data Preprocessing (contd.)</a:t>
-            </a:r>
-            <a:endParaRPr lang="en-IN" dirty="0"/>
-          </a:p>
-        </p:txBody>
-      </p:sp>
-      <p:sp>
-        <p:nvSpPr>
-          <p:cNvPr id="3" name="Content Placeholder 2">
-            <a:extLst>
-              <a:ext uri="{FF2B5EF4-FFF2-40B4-BE49-F238E27FC236}">
-                <a16:creationId xmlns:a16="http://schemas.microsoft.com/office/drawing/2014/main" id="{BD8A1B46-CE17-4BCA-90FB-261200574E2E}"/>
-              </a:ext>
-            </a:extLst>
-          </p:cNvPr>
-          <p:cNvSpPr>
-            <a:spLocks noGrp="1"/>
-          </p:cNvSpPr>
-          <p:nvPr>
-            <p:ph idx="1"/>
-          </p:nvPr>
-        </p:nvSpPr>
-        <p:spPr>
-          <a:xfrm>
-            <a:off x="720000" y="1717873"/>
-            <a:ext cx="8640000" cy="4384800"/>
-          </a:xfrm>
-        </p:spPr>
-        <p:txBody>
-          <a:bodyPr/>
-          <a:lstStyle/>
-          <a:p>
-            <a:pPr marL="457200" indent="-457200">
-              <a:buFont typeface="Arial" panose="020B0604020202020204" pitchFamily="34" charset="0"/>
-              <a:buChar char="•"/>
-            </a:pPr>
-            <a:r>
-              <a:rPr lang="en-US" dirty="0"/>
-              <a:t>After curating legible news articles, we then move onto processing that news.</a:t>
-            </a:r>
-          </a:p>
-          <a:p>
-            <a:pPr marL="457200" indent="-457200">
-              <a:buFont typeface="Arial" panose="020B0604020202020204" pitchFamily="34" charset="0"/>
-              <a:buChar char="•"/>
-            </a:pPr>
-            <a:r>
-              <a:rPr lang="en-US" dirty="0"/>
-              <a:t>For this, we will use sentiment analysis to calculate a normalized score and a magnitude score. </a:t>
-            </a:r>
-          </a:p>
-          <a:p>
-            <a:pPr marL="457200" indent="-457200">
-              <a:buFont typeface="Arial" panose="020B0604020202020204" pitchFamily="34" charset="0"/>
-              <a:buChar char="•"/>
-            </a:pPr>
-            <a:r>
-              <a:rPr lang="en-US" dirty="0"/>
-              <a:t>Derived a formula for sentiment magnitude, along with a scaling factor. Preprocessed data for various alphas.</a:t>
-            </a:r>
-          </a:p>
-          <a:p>
-            <a:pPr marL="457200" indent="-457200">
-              <a:buFont typeface="Arial" panose="020B0604020202020204" pitchFamily="34" charset="0"/>
-              <a:buChar char="•"/>
-            </a:pPr>
-            <a:r>
-              <a:rPr lang="en-US" dirty="0"/>
-              <a:t>As discussed back in review 1, this will help in measuring each news articles to determine “what type” of sentiment and “how much” of that sentiment.</a:t>
-            </a:r>
-          </a:p>
-          <a:p>
-            <a:pPr marL="457200" indent="-457200">
-              <a:buFont typeface="Arial" panose="020B0604020202020204" pitchFamily="34" charset="0"/>
-              <a:buChar char="•"/>
-            </a:pPr>
-            <a:r>
-              <a:rPr lang="en-US" dirty="0"/>
-              <a:t>This ultimately will help us calculate our loss function for the deep neural network. </a:t>
-            </a:r>
-            <a:endParaRPr lang="en-IN" dirty="0"/>
-          </a:p>
-        </p:txBody>
-      </p:sp>
-    </p:spTree>
-    <p:extLst>
-      <p:ext uri="{BB962C8B-B14F-4D97-AF65-F5344CB8AC3E}">
-        <p14:creationId xmlns:p14="http://schemas.microsoft.com/office/powerpoint/2010/main" val="224779920"/>
-      </p:ext>
-    </p:extLst>
   </p:cSld>
   <p:clrMapOvr>
     <a:masterClrMapping/>

</xml_diff>